<commit_message>
Lab02: Add technical article on data mining for online retail and update presentation file
</commit_message>
<xml_diff>
--- a/Lab02/online_retail.pptx
+++ b/Lab02/online_retail.pptx
@@ -7,6 +7,29 @@
   <p:sldIdLst>
     <p:sldId id="256" r:id="rId2"/>
     <p:sldId id="257" r:id="rId3"/>
+    <p:sldId id="258" r:id="rId4"/>
+    <p:sldId id="259" r:id="rId5"/>
+    <p:sldId id="260" r:id="rId6"/>
+    <p:sldId id="261" r:id="rId7"/>
+    <p:sldId id="262" r:id="rId8"/>
+    <p:sldId id="263" r:id="rId9"/>
+    <p:sldId id="264" r:id="rId10"/>
+    <p:sldId id="265" r:id="rId11"/>
+    <p:sldId id="266" r:id="rId12"/>
+    <p:sldId id="267" r:id="rId13"/>
+    <p:sldId id="268" r:id="rId14"/>
+    <p:sldId id="269" r:id="rId15"/>
+    <p:sldId id="270" r:id="rId16"/>
+    <p:sldId id="271" r:id="rId17"/>
+    <p:sldId id="272" r:id="rId18"/>
+    <p:sldId id="273" r:id="rId19"/>
+    <p:sldId id="274" r:id="rId20"/>
+    <p:sldId id="275" r:id="rId21"/>
+    <p:sldId id="276" r:id="rId22"/>
+    <p:sldId id="277" r:id="rId23"/>
+    <p:sldId id="278" r:id="rId24"/>
+    <p:sldId id="279" r:id="rId25"/>
+    <p:sldId id="280" r:id="rId26"/>
   </p:sldIdLst>
   <p:sldSz cx="12192000" cy="6858000"/>
   <p:notesSz cx="6858000" cy="9144000"/>
@@ -105,6 +128,11 @@
       </a:defRPr>
     </a:lvl9pPr>
   </p:defaultTextStyle>
+  <p:extLst>
+    <p:ext uri="{EFAFB233-063F-42B5-8137-9DF3F51BA10A}">
+      <p15:sldGuideLst xmlns:p15="http://schemas.microsoft.com/office/powerpoint/2012/main"/>
+    </p:ext>
+  </p:extLst>
 </p:presentation>
 </file>
 
@@ -255,7 +283,7 @@
           <a:p>
             <a:fld id="{FA2EF08D-676D-4E9F-939E-4861AA2F5D57}" type="datetimeFigureOut">
               <a:rPr lang="en-US" smtClean="0"/>
-              <a:t>9/27/2025</a:t>
+              <a:t>9/28/2025</a:t>
             </a:fld>
             <a:endParaRPr lang="en-US"/>
           </a:p>
@@ -453,7 +481,7 @@
           <a:p>
             <a:fld id="{FA2EF08D-676D-4E9F-939E-4861AA2F5D57}" type="datetimeFigureOut">
               <a:rPr lang="en-US" smtClean="0"/>
-              <a:t>9/27/2025</a:t>
+              <a:t>9/28/2025</a:t>
             </a:fld>
             <a:endParaRPr lang="en-US"/>
           </a:p>
@@ -661,7 +689,7 @@
           <a:p>
             <a:fld id="{FA2EF08D-676D-4E9F-939E-4861AA2F5D57}" type="datetimeFigureOut">
               <a:rPr lang="en-US" smtClean="0"/>
-              <a:t>9/27/2025</a:t>
+              <a:t>9/28/2025</a:t>
             </a:fld>
             <a:endParaRPr lang="en-US"/>
           </a:p>
@@ -859,7 +887,7 @@
           <a:p>
             <a:fld id="{FA2EF08D-676D-4E9F-939E-4861AA2F5D57}" type="datetimeFigureOut">
               <a:rPr lang="en-US" smtClean="0"/>
-              <a:t>9/27/2025</a:t>
+              <a:t>9/28/2025</a:t>
             </a:fld>
             <a:endParaRPr lang="en-US"/>
           </a:p>
@@ -1134,7 +1162,7 @@
           <a:p>
             <a:fld id="{FA2EF08D-676D-4E9F-939E-4861AA2F5D57}" type="datetimeFigureOut">
               <a:rPr lang="en-US" smtClean="0"/>
-              <a:t>9/27/2025</a:t>
+              <a:t>9/28/2025</a:t>
             </a:fld>
             <a:endParaRPr lang="en-US"/>
           </a:p>
@@ -1399,7 +1427,7 @@
           <a:p>
             <a:fld id="{FA2EF08D-676D-4E9F-939E-4861AA2F5D57}" type="datetimeFigureOut">
               <a:rPr lang="en-US" smtClean="0"/>
-              <a:t>9/27/2025</a:t>
+              <a:t>9/28/2025</a:t>
             </a:fld>
             <a:endParaRPr lang="en-US"/>
           </a:p>
@@ -1811,7 +1839,7 @@
           <a:p>
             <a:fld id="{FA2EF08D-676D-4E9F-939E-4861AA2F5D57}" type="datetimeFigureOut">
               <a:rPr lang="en-US" smtClean="0"/>
-              <a:t>9/27/2025</a:t>
+              <a:t>9/28/2025</a:t>
             </a:fld>
             <a:endParaRPr lang="en-US"/>
           </a:p>
@@ -1952,7 +1980,7 @@
           <a:p>
             <a:fld id="{FA2EF08D-676D-4E9F-939E-4861AA2F5D57}" type="datetimeFigureOut">
               <a:rPr lang="en-US" smtClean="0"/>
-              <a:t>9/27/2025</a:t>
+              <a:t>9/28/2025</a:t>
             </a:fld>
             <a:endParaRPr lang="en-US"/>
           </a:p>
@@ -2065,7 +2093,7 @@
           <a:p>
             <a:fld id="{FA2EF08D-676D-4E9F-939E-4861AA2F5D57}" type="datetimeFigureOut">
               <a:rPr lang="en-US" smtClean="0"/>
-              <a:t>9/27/2025</a:t>
+              <a:t>9/28/2025</a:t>
             </a:fld>
             <a:endParaRPr lang="en-US"/>
           </a:p>
@@ -2376,7 +2404,7 @@
           <a:p>
             <a:fld id="{FA2EF08D-676D-4E9F-939E-4861AA2F5D57}" type="datetimeFigureOut">
               <a:rPr lang="en-US" smtClean="0"/>
-              <a:t>9/27/2025</a:t>
+              <a:t>9/28/2025</a:t>
             </a:fld>
             <a:endParaRPr lang="en-US"/>
           </a:p>
@@ -2664,7 +2692,7 @@
           <a:p>
             <a:fld id="{FA2EF08D-676D-4E9F-939E-4861AA2F5D57}" type="datetimeFigureOut">
               <a:rPr lang="en-US" smtClean="0"/>
-              <a:t>9/27/2025</a:t>
+              <a:t>9/28/2025</a:t>
             </a:fld>
             <a:endParaRPr lang="en-US"/>
           </a:p>
@@ -2905,7 +2933,7 @@
           <a:p>
             <a:fld id="{FA2EF08D-676D-4E9F-939E-4861AA2F5D57}" type="datetimeFigureOut">
               <a:rPr lang="en-US" smtClean="0"/>
-              <a:t>9/27/2025</a:t>
+              <a:t>9/28/2025</a:t>
             </a:fld>
             <a:endParaRPr lang="en-US"/>
           </a:p>
@@ -3402,6 +3430,1311 @@
 </p:sld>
 </file>
 
+<file path=ppt/slides/slide10.xml><?xml version="1.0" encoding="utf-8"?>
+<p:sld xmlns:a="http://schemas.openxmlformats.org/drawingml/2006/main" xmlns:r="http://schemas.openxmlformats.org/officeDocument/2006/relationships" xmlns:p="http://schemas.openxmlformats.org/presentationml/2006/main">
+  <p:cSld>
+    <p:spTree>
+      <p:nvGrpSpPr>
+        <p:cNvPr id="1" name=""/>
+        <p:cNvGrpSpPr/>
+        <p:nvPr/>
+      </p:nvGrpSpPr>
+      <p:grpSpPr>
+        <a:xfrm>
+          <a:off x="0" y="0"/>
+          <a:ext cx="0" cy="0"/>
+          <a:chOff x="0" y="0"/>
+          <a:chExt cx="0" cy="0"/>
+        </a:xfrm>
+      </p:grpSpPr>
+      <p:sp>
+        <p:nvSpPr>
+          <p:cNvPr id="2" name="Title 1">
+            <a:extLst>
+              <a:ext uri="{FF2B5EF4-FFF2-40B4-BE49-F238E27FC236}">
+                <a16:creationId xmlns:a16="http://schemas.microsoft.com/office/drawing/2014/main" id="{A4A9F5C6-6EDC-4CD3-865E-76772C7C3FD3}"/>
+              </a:ext>
+            </a:extLst>
+          </p:cNvPr>
+          <p:cNvSpPr>
+            <a:spLocks noGrp="1"/>
+          </p:cNvSpPr>
+          <p:nvPr>
+            <p:ph type="title"/>
+          </p:nvPr>
+        </p:nvSpPr>
+        <p:spPr/>
+        <p:txBody>
+          <a:bodyPr/>
+          <a:lstStyle/>
+          <a:p>
+            <a:r>
+              <a:rPr lang="en-US"/>
+              <a:t>Dữ liệu sau khi đã làm sạch:</a:t>
+            </a:r>
+          </a:p>
+        </p:txBody>
+      </p:sp>
+      <p:pic>
+        <p:nvPicPr>
+          <p:cNvPr id="4" name="Content Placeholder 3">
+            <a:extLst>
+              <a:ext uri="{FF2B5EF4-FFF2-40B4-BE49-F238E27FC236}">
+                <a16:creationId xmlns:a16="http://schemas.microsoft.com/office/drawing/2014/main" id="{8ED33E1E-175D-4EED-9698-40C0D9FD0D96}"/>
+              </a:ext>
+            </a:extLst>
+          </p:cNvPr>
+          <p:cNvPicPr>
+            <a:picLocks noGrp="1" noChangeAspect="1"/>
+          </p:cNvPicPr>
+          <p:nvPr>
+            <p:ph idx="1"/>
+          </p:nvPr>
+        </p:nvPicPr>
+        <p:blipFill>
+          <a:blip r:embed="rId2"/>
+          <a:stretch>
+            <a:fillRect/>
+          </a:stretch>
+        </p:blipFill>
+        <p:spPr>
+          <a:xfrm>
+            <a:off x="493059" y="1825625"/>
+            <a:ext cx="11313459" cy="4351338"/>
+          </a:xfrm>
+          <a:prstGeom prst="rect">
+            <a:avLst/>
+          </a:prstGeom>
+        </p:spPr>
+      </p:pic>
+    </p:spTree>
+    <p:extLst>
+      <p:ext uri="{BB962C8B-B14F-4D97-AF65-F5344CB8AC3E}">
+        <p14:creationId xmlns:p14="http://schemas.microsoft.com/office/powerpoint/2010/main" val="1178866323"/>
+      </p:ext>
+    </p:extLst>
+  </p:cSld>
+  <p:clrMapOvr>
+    <a:masterClrMapping/>
+  </p:clrMapOvr>
+</p:sld>
+</file>
+
+<file path=ppt/slides/slide11.xml><?xml version="1.0" encoding="utf-8"?>
+<p:sld xmlns:a="http://schemas.openxmlformats.org/drawingml/2006/main" xmlns:r="http://schemas.openxmlformats.org/officeDocument/2006/relationships" xmlns:p="http://schemas.openxmlformats.org/presentationml/2006/main">
+  <p:cSld>
+    <p:spTree>
+      <p:nvGrpSpPr>
+        <p:cNvPr id="1" name=""/>
+        <p:cNvGrpSpPr/>
+        <p:nvPr/>
+      </p:nvGrpSpPr>
+      <p:grpSpPr>
+        <a:xfrm>
+          <a:off x="0" y="0"/>
+          <a:ext cx="0" cy="0"/>
+          <a:chOff x="0" y="0"/>
+          <a:chExt cx="0" cy="0"/>
+        </a:xfrm>
+      </p:grpSpPr>
+      <p:sp>
+        <p:nvSpPr>
+          <p:cNvPr id="2" name="Title 1">
+            <a:extLst>
+              <a:ext uri="{FF2B5EF4-FFF2-40B4-BE49-F238E27FC236}">
+                <a16:creationId xmlns:a16="http://schemas.microsoft.com/office/drawing/2014/main" id="{92951875-DD96-4DAF-A466-267900E98766}"/>
+              </a:ext>
+            </a:extLst>
+          </p:cNvPr>
+          <p:cNvSpPr>
+            <a:spLocks noGrp="1"/>
+          </p:cNvSpPr>
+          <p:nvPr>
+            <p:ph type="title"/>
+          </p:nvPr>
+        </p:nvSpPr>
+        <p:spPr/>
+        <p:txBody>
+          <a:bodyPr>
+            <a:normAutofit/>
+          </a:bodyPr>
+          <a:lstStyle/>
+          <a:p>
+            <a:r>
+              <a:rPr lang="en-US" sz="3000">
+                <a:latin typeface="Times New Roman" panose="02020603050405020304" pitchFamily="18" charset="0"/>
+                <a:cs typeface="Times New Roman" panose="02020603050405020304" pitchFamily="18" charset="0"/>
+              </a:rPr>
+              <a:t>4. Tính toán RFM:</a:t>
+            </a:r>
+          </a:p>
+        </p:txBody>
+      </p:sp>
+      <p:sp>
+        <p:nvSpPr>
+          <p:cNvPr id="3" name="Content Placeholder 2">
+            <a:extLst>
+              <a:ext uri="{FF2B5EF4-FFF2-40B4-BE49-F238E27FC236}">
+                <a16:creationId xmlns:a16="http://schemas.microsoft.com/office/drawing/2014/main" id="{56DFFEBA-D7AA-41C5-999C-8860F3339788}"/>
+              </a:ext>
+            </a:extLst>
+          </p:cNvPr>
+          <p:cNvSpPr>
+            <a:spLocks noGrp="1"/>
+          </p:cNvSpPr>
+          <p:nvPr>
+            <p:ph idx="1"/>
+          </p:nvPr>
+        </p:nvSpPr>
+        <p:spPr/>
+        <p:txBody>
+          <a:bodyPr/>
+          <a:lstStyle/>
+          <a:p>
+            <a:r>
+              <a:rPr lang="en-US">
+                <a:latin typeface="Times New Roman" panose="02020603050405020304" pitchFamily="18" charset="0"/>
+                <a:cs typeface="Times New Roman" panose="02020603050405020304" pitchFamily="18" charset="0"/>
+              </a:rPr>
+              <a:t>Recency (R): số ngày kể từ lần mua gần nhất.</a:t>
+            </a:r>
+          </a:p>
+          <a:p>
+            <a:r>
+              <a:rPr lang="en-US">
+                <a:latin typeface="Times New Roman" panose="02020603050405020304" pitchFamily="18" charset="0"/>
+                <a:cs typeface="Times New Roman" panose="02020603050405020304" pitchFamily="18" charset="0"/>
+              </a:rPr>
+              <a:t>Frequency (F): số lần mua hàng (hóa đ</a:t>
+            </a:r>
+            <a:r>
+              <a:rPr lang="vi-VN">
+                <a:latin typeface="Times New Roman" panose="02020603050405020304" pitchFamily="18" charset="0"/>
+                <a:cs typeface="Times New Roman" panose="02020603050405020304" pitchFamily="18" charset="0"/>
+              </a:rPr>
+              <a:t>ơ</a:t>
+            </a:r>
+            <a:r>
+              <a:rPr lang="en-US">
+                <a:latin typeface="Times New Roman" panose="02020603050405020304" pitchFamily="18" charset="0"/>
+                <a:cs typeface="Times New Roman" panose="02020603050405020304" pitchFamily="18" charset="0"/>
+              </a:rPr>
+              <a:t>n).</a:t>
+            </a:r>
+          </a:p>
+          <a:p>
+            <a:r>
+              <a:rPr lang="en-US">
+                <a:latin typeface="Times New Roman" panose="02020603050405020304" pitchFamily="18" charset="0"/>
+                <a:cs typeface="Times New Roman" panose="02020603050405020304" pitchFamily="18" charset="0"/>
+              </a:rPr>
+              <a:t>Monetary (M): tổng số tiền khách đã chi tiêu.</a:t>
+            </a:r>
+          </a:p>
+          <a:p>
+            <a:pPr marL="0" indent="0">
+              <a:buNone/>
+            </a:pPr>
+            <a:r>
+              <a:rPr lang="en-US">
+                <a:latin typeface="Times New Roman" panose="02020603050405020304" pitchFamily="18" charset="0"/>
+                <a:cs typeface="Times New Roman" panose="02020603050405020304" pitchFamily="18" charset="0"/>
+              </a:rPr>
+              <a:t> </a:t>
+            </a:r>
+          </a:p>
+        </p:txBody>
+      </p:sp>
+    </p:spTree>
+    <p:extLst>
+      <p:ext uri="{BB962C8B-B14F-4D97-AF65-F5344CB8AC3E}">
+        <p14:creationId xmlns:p14="http://schemas.microsoft.com/office/powerpoint/2010/main" val="53426259"/>
+      </p:ext>
+    </p:extLst>
+  </p:cSld>
+  <p:clrMapOvr>
+    <a:masterClrMapping/>
+  </p:clrMapOvr>
+</p:sld>
+</file>
+
+<file path=ppt/slides/slide12.xml><?xml version="1.0" encoding="utf-8"?>
+<p:sld xmlns:a="http://schemas.openxmlformats.org/drawingml/2006/main" xmlns:r="http://schemas.openxmlformats.org/officeDocument/2006/relationships" xmlns:p="http://schemas.openxmlformats.org/presentationml/2006/main">
+  <p:cSld>
+    <p:spTree>
+      <p:nvGrpSpPr>
+        <p:cNvPr id="1" name=""/>
+        <p:cNvGrpSpPr/>
+        <p:nvPr/>
+      </p:nvGrpSpPr>
+      <p:grpSpPr>
+        <a:xfrm>
+          <a:off x="0" y="0"/>
+          <a:ext cx="0" cy="0"/>
+          <a:chOff x="0" y="0"/>
+          <a:chExt cx="0" cy="0"/>
+        </a:xfrm>
+      </p:grpSpPr>
+      <p:sp>
+        <p:nvSpPr>
+          <p:cNvPr id="2" name="Title 1">
+            <a:extLst>
+              <a:ext uri="{FF2B5EF4-FFF2-40B4-BE49-F238E27FC236}">
+                <a16:creationId xmlns:a16="http://schemas.microsoft.com/office/drawing/2014/main" id="{8235B280-4524-4162-B600-C19D373EB402}"/>
+              </a:ext>
+            </a:extLst>
+          </p:cNvPr>
+          <p:cNvSpPr>
+            <a:spLocks noGrp="1"/>
+          </p:cNvSpPr>
+          <p:nvPr>
+            <p:ph type="title"/>
+          </p:nvPr>
+        </p:nvSpPr>
+        <p:spPr/>
+        <p:txBody>
+          <a:bodyPr>
+            <a:normAutofit/>
+          </a:bodyPr>
+          <a:lstStyle/>
+          <a:p>
+            <a:pPr algn="ctr"/>
+            <a:r>
+              <a:rPr lang="en-US">
+                <a:latin typeface="Times New Roman" panose="02020603050405020304" pitchFamily="18" charset="0"/>
+                <a:cs typeface="Times New Roman" panose="02020603050405020304" pitchFamily="18" charset="0"/>
+              </a:rPr>
+              <a:t>Dữ liệu sau khi tính toán:</a:t>
+            </a:r>
+            <a:br>
+              <a:rPr lang="en-US">
+                <a:latin typeface="Times New Roman" panose="02020603050405020304" pitchFamily="18" charset="0"/>
+                <a:cs typeface="Times New Roman" panose="02020603050405020304" pitchFamily="18" charset="0"/>
+              </a:rPr>
+            </a:br>
+            <a:r>
+              <a:rPr lang="en-US">
+                <a:latin typeface="Times New Roman" panose="02020603050405020304" pitchFamily="18" charset="0"/>
+                <a:cs typeface="Times New Roman" panose="02020603050405020304" pitchFamily="18" charset="0"/>
+              </a:rPr>
+              <a:t>10 dòng đầu</a:t>
+            </a:r>
+          </a:p>
+        </p:txBody>
+      </p:sp>
+      <p:pic>
+        <p:nvPicPr>
+          <p:cNvPr id="4" name="Content Placeholder 3">
+            <a:extLst>
+              <a:ext uri="{FF2B5EF4-FFF2-40B4-BE49-F238E27FC236}">
+                <a16:creationId xmlns:a16="http://schemas.microsoft.com/office/drawing/2014/main" id="{771EC1A8-F0C0-4ED2-A0B4-6E51935DBDAC}"/>
+              </a:ext>
+            </a:extLst>
+          </p:cNvPr>
+          <p:cNvPicPr>
+            <a:picLocks noGrp="1" noChangeAspect="1"/>
+          </p:cNvPicPr>
+          <p:nvPr>
+            <p:ph idx="1"/>
+          </p:nvPr>
+        </p:nvPicPr>
+        <p:blipFill>
+          <a:blip r:embed="rId2"/>
+          <a:stretch>
+            <a:fillRect/>
+          </a:stretch>
+        </p:blipFill>
+        <p:spPr>
+          <a:xfrm>
+            <a:off x="914399" y="1825625"/>
+            <a:ext cx="10515599" cy="4351338"/>
+          </a:xfrm>
+          <a:prstGeom prst="rect">
+            <a:avLst/>
+          </a:prstGeom>
+        </p:spPr>
+      </p:pic>
+    </p:spTree>
+    <p:extLst>
+      <p:ext uri="{BB962C8B-B14F-4D97-AF65-F5344CB8AC3E}">
+        <p14:creationId xmlns:p14="http://schemas.microsoft.com/office/powerpoint/2010/main" val="300222322"/>
+      </p:ext>
+    </p:extLst>
+  </p:cSld>
+  <p:clrMapOvr>
+    <a:masterClrMapping/>
+  </p:clrMapOvr>
+</p:sld>
+</file>
+
+<file path=ppt/slides/slide13.xml><?xml version="1.0" encoding="utf-8"?>
+<p:sld xmlns:a="http://schemas.openxmlformats.org/drawingml/2006/main" xmlns:r="http://schemas.openxmlformats.org/officeDocument/2006/relationships" xmlns:p="http://schemas.openxmlformats.org/presentationml/2006/main">
+  <p:cSld>
+    <p:spTree>
+      <p:nvGrpSpPr>
+        <p:cNvPr id="1" name=""/>
+        <p:cNvGrpSpPr/>
+        <p:nvPr/>
+      </p:nvGrpSpPr>
+      <p:grpSpPr>
+        <a:xfrm>
+          <a:off x="0" y="0"/>
+          <a:ext cx="0" cy="0"/>
+          <a:chOff x="0" y="0"/>
+          <a:chExt cx="0" cy="0"/>
+        </a:xfrm>
+      </p:grpSpPr>
+      <p:sp>
+        <p:nvSpPr>
+          <p:cNvPr id="2" name="Title 1">
+            <a:extLst>
+              <a:ext uri="{FF2B5EF4-FFF2-40B4-BE49-F238E27FC236}">
+                <a16:creationId xmlns:a16="http://schemas.microsoft.com/office/drawing/2014/main" id="{387AE025-DFD8-473E-AD2C-882EAE3020CA}"/>
+              </a:ext>
+            </a:extLst>
+          </p:cNvPr>
+          <p:cNvSpPr>
+            <a:spLocks noGrp="1"/>
+          </p:cNvSpPr>
+          <p:nvPr>
+            <p:ph type="title"/>
+          </p:nvPr>
+        </p:nvSpPr>
+        <p:spPr/>
+        <p:txBody>
+          <a:bodyPr/>
+          <a:lstStyle/>
+          <a:p>
+            <a:r>
+              <a:rPr lang="en-US">
+                <a:latin typeface="Times New Roman" panose="02020603050405020304" pitchFamily="18" charset="0"/>
+                <a:cs typeface="Times New Roman" panose="02020603050405020304" pitchFamily="18" charset="0"/>
+              </a:rPr>
+              <a:t>Biểu đồ phân phối:</a:t>
+            </a:r>
+          </a:p>
+        </p:txBody>
+      </p:sp>
+      <p:pic>
+        <p:nvPicPr>
+          <p:cNvPr id="4" name="Content Placeholder 3">
+            <a:extLst>
+              <a:ext uri="{FF2B5EF4-FFF2-40B4-BE49-F238E27FC236}">
+                <a16:creationId xmlns:a16="http://schemas.microsoft.com/office/drawing/2014/main" id="{524238A0-9778-479E-887E-F1DAC4A59974}"/>
+              </a:ext>
+            </a:extLst>
+          </p:cNvPr>
+          <p:cNvPicPr>
+            <a:picLocks noGrp="1" noChangeAspect="1"/>
+          </p:cNvPicPr>
+          <p:nvPr>
+            <p:ph idx="1"/>
+          </p:nvPr>
+        </p:nvPicPr>
+        <p:blipFill>
+          <a:blip r:embed="rId2"/>
+          <a:stretch>
+            <a:fillRect/>
+          </a:stretch>
+        </p:blipFill>
+        <p:spPr>
+          <a:xfrm>
+            <a:off x="838200" y="2310272"/>
+            <a:ext cx="10515600" cy="3382044"/>
+          </a:xfrm>
+          <a:prstGeom prst="rect">
+            <a:avLst/>
+          </a:prstGeom>
+        </p:spPr>
+      </p:pic>
+    </p:spTree>
+    <p:extLst>
+      <p:ext uri="{BB962C8B-B14F-4D97-AF65-F5344CB8AC3E}">
+        <p14:creationId xmlns:p14="http://schemas.microsoft.com/office/powerpoint/2010/main" val="3134303056"/>
+      </p:ext>
+    </p:extLst>
+  </p:cSld>
+  <p:clrMapOvr>
+    <a:masterClrMapping/>
+  </p:clrMapOvr>
+</p:sld>
+</file>
+
+<file path=ppt/slides/slide14.xml><?xml version="1.0" encoding="utf-8"?>
+<p:sld xmlns:a="http://schemas.openxmlformats.org/drawingml/2006/main" xmlns:r="http://schemas.openxmlformats.org/officeDocument/2006/relationships" xmlns:p="http://schemas.openxmlformats.org/presentationml/2006/main">
+  <p:cSld>
+    <p:spTree>
+      <p:nvGrpSpPr>
+        <p:cNvPr id="1" name=""/>
+        <p:cNvGrpSpPr/>
+        <p:nvPr/>
+      </p:nvGrpSpPr>
+      <p:grpSpPr>
+        <a:xfrm>
+          <a:off x="0" y="0"/>
+          <a:ext cx="0" cy="0"/>
+          <a:chOff x="0" y="0"/>
+          <a:chExt cx="0" cy="0"/>
+        </a:xfrm>
+      </p:grpSpPr>
+      <p:sp>
+        <p:nvSpPr>
+          <p:cNvPr id="2" name="Title 1">
+            <a:extLst>
+              <a:ext uri="{FF2B5EF4-FFF2-40B4-BE49-F238E27FC236}">
+                <a16:creationId xmlns:a16="http://schemas.microsoft.com/office/drawing/2014/main" id="{20EA4F40-8A6E-4EB8-99D4-677128B00BEC}"/>
+              </a:ext>
+            </a:extLst>
+          </p:cNvPr>
+          <p:cNvSpPr>
+            <a:spLocks noGrp="1"/>
+          </p:cNvSpPr>
+          <p:nvPr>
+            <p:ph type="title"/>
+          </p:nvPr>
+        </p:nvSpPr>
+        <p:spPr/>
+        <p:txBody>
+          <a:bodyPr/>
+          <a:lstStyle/>
+          <a:p>
+            <a:r>
+              <a:rPr lang="en-US">
+                <a:latin typeface="Times New Roman" panose="02020603050405020304" pitchFamily="18" charset="0"/>
+                <a:cs typeface="Times New Roman" panose="02020603050405020304" pitchFamily="18" charset="0"/>
+              </a:rPr>
+              <a:t>Nhận xét:</a:t>
+            </a:r>
+          </a:p>
+        </p:txBody>
+      </p:sp>
+      <p:sp>
+        <p:nvSpPr>
+          <p:cNvPr id="3" name="Content Placeholder 2">
+            <a:extLst>
+              <a:ext uri="{FF2B5EF4-FFF2-40B4-BE49-F238E27FC236}">
+                <a16:creationId xmlns:a16="http://schemas.microsoft.com/office/drawing/2014/main" id="{63B45CA8-F63A-4C1A-9D3E-3CD92C3A6510}"/>
+              </a:ext>
+            </a:extLst>
+          </p:cNvPr>
+          <p:cNvSpPr>
+            <a:spLocks noGrp="1"/>
+          </p:cNvSpPr>
+          <p:nvPr>
+            <p:ph idx="1"/>
+          </p:nvPr>
+        </p:nvSpPr>
+        <p:spPr/>
+        <p:txBody>
+          <a:bodyPr/>
+          <a:lstStyle/>
+          <a:p>
+            <a:r>
+              <a:rPr lang="en-US" b="1">
+                <a:latin typeface="Times New Roman" panose="02020603050405020304" pitchFamily="18" charset="0"/>
+                <a:cs typeface="Times New Roman" panose="02020603050405020304" pitchFamily="18" charset="0"/>
+              </a:rPr>
+              <a:t>Recency</a:t>
+            </a:r>
+            <a:r>
+              <a:rPr lang="en-US">
+                <a:latin typeface="Times New Roman" panose="02020603050405020304" pitchFamily="18" charset="0"/>
+                <a:cs typeface="Times New Roman" panose="02020603050405020304" pitchFamily="18" charset="0"/>
+              </a:rPr>
+              <a:t>: Phân phối lệch phải, đa số khách hàng mua hàng gần đây (nhiều khách Recency nhỏ), ít khách lâu không quay lại.</a:t>
+            </a:r>
+          </a:p>
+          <a:p>
+            <a:r>
+              <a:rPr lang="en-US" b="1">
+                <a:latin typeface="Times New Roman" panose="02020603050405020304" pitchFamily="18" charset="0"/>
+                <a:cs typeface="Times New Roman" panose="02020603050405020304" pitchFamily="18" charset="0"/>
+              </a:rPr>
+              <a:t>Frequency</a:t>
+            </a:r>
+            <a:r>
+              <a:rPr lang="en-US">
+                <a:latin typeface="Times New Roman" panose="02020603050405020304" pitchFamily="18" charset="0"/>
+                <a:cs typeface="Times New Roman" panose="02020603050405020304" pitchFamily="18" charset="0"/>
+              </a:rPr>
+              <a:t>: Rất lệch phải, phần lớn khách mua rất ít lần, chỉ có số ít mua nhiều lần.</a:t>
+            </a:r>
+          </a:p>
+          <a:p>
+            <a:r>
+              <a:rPr lang="en-US" b="1">
+                <a:latin typeface="Times New Roman" panose="02020603050405020304" pitchFamily="18" charset="0"/>
+                <a:cs typeface="Times New Roman" panose="02020603050405020304" pitchFamily="18" charset="0"/>
+              </a:rPr>
+              <a:t>Monetary</a:t>
+            </a:r>
+            <a:r>
+              <a:rPr lang="en-US">
+                <a:latin typeface="Times New Roman" panose="02020603050405020304" pitchFamily="18" charset="0"/>
+                <a:cs typeface="Times New Roman" panose="02020603050405020304" pitchFamily="18" charset="0"/>
+              </a:rPr>
+              <a:t>: Cũng lệch phải mạnh, đa số chi tiêu ít, chỉ một số ít khách chi tiêu rất lớn.</a:t>
+            </a:r>
+          </a:p>
+          <a:p>
+            <a:pPr marL="0" indent="0">
+              <a:buNone/>
+            </a:pPr>
+            <a:r>
+              <a:rPr lang="en-US">
+                <a:latin typeface="Times New Roman" panose="02020603050405020304" pitchFamily="18" charset="0"/>
+                <a:cs typeface="Times New Roman" panose="02020603050405020304" pitchFamily="18" charset="0"/>
+              </a:rPr>
+              <a:t>=&gt; Nhìn chung, cả 3 biến trong RFM đều có phân phối không cân đối, tập trung vào giá trị nhỏ, chỉ có một số ít khách hàng có giá trị cao (outlier).</a:t>
+            </a:r>
+          </a:p>
+        </p:txBody>
+      </p:sp>
+    </p:spTree>
+    <p:extLst>
+      <p:ext uri="{BB962C8B-B14F-4D97-AF65-F5344CB8AC3E}">
+        <p14:creationId xmlns:p14="http://schemas.microsoft.com/office/powerpoint/2010/main" val="3037003149"/>
+      </p:ext>
+    </p:extLst>
+  </p:cSld>
+  <p:clrMapOvr>
+    <a:masterClrMapping/>
+  </p:clrMapOvr>
+</p:sld>
+</file>
+
+<file path=ppt/slides/slide15.xml><?xml version="1.0" encoding="utf-8"?>
+<p:sld xmlns:a="http://schemas.openxmlformats.org/drawingml/2006/main" xmlns:r="http://schemas.openxmlformats.org/officeDocument/2006/relationships" xmlns:p="http://schemas.openxmlformats.org/presentationml/2006/main">
+  <p:cSld>
+    <p:spTree>
+      <p:nvGrpSpPr>
+        <p:cNvPr id="1" name=""/>
+        <p:cNvGrpSpPr/>
+        <p:nvPr/>
+      </p:nvGrpSpPr>
+      <p:grpSpPr>
+        <a:xfrm>
+          <a:off x="0" y="0"/>
+          <a:ext cx="0" cy="0"/>
+          <a:chOff x="0" y="0"/>
+          <a:chExt cx="0" cy="0"/>
+        </a:xfrm>
+      </p:grpSpPr>
+      <p:sp>
+        <p:nvSpPr>
+          <p:cNvPr id="2" name="Title 1">
+            <a:extLst>
+              <a:ext uri="{FF2B5EF4-FFF2-40B4-BE49-F238E27FC236}">
+                <a16:creationId xmlns:a16="http://schemas.microsoft.com/office/drawing/2014/main" id="{B5876A67-95FB-452B-B404-2D96EDFB57D0}"/>
+              </a:ext>
+            </a:extLst>
+          </p:cNvPr>
+          <p:cNvSpPr>
+            <a:spLocks noGrp="1"/>
+          </p:cNvSpPr>
+          <p:nvPr>
+            <p:ph type="title"/>
+          </p:nvPr>
+        </p:nvSpPr>
+        <p:spPr/>
+        <p:txBody>
+          <a:bodyPr/>
+          <a:lstStyle/>
+          <a:p>
+            <a:r>
+              <a:rPr lang="en-US">
+                <a:latin typeface="Times New Roman" panose="02020603050405020304" pitchFamily="18" charset="0"/>
+                <a:cs typeface="Times New Roman" panose="02020603050405020304" pitchFamily="18" charset="0"/>
+              </a:rPr>
+              <a:t>Biểu đồ heatmap:</a:t>
+            </a:r>
+          </a:p>
+        </p:txBody>
+      </p:sp>
+      <p:pic>
+        <p:nvPicPr>
+          <p:cNvPr id="4" name="Content Placeholder 3">
+            <a:extLst>
+              <a:ext uri="{FF2B5EF4-FFF2-40B4-BE49-F238E27FC236}">
+                <a16:creationId xmlns:a16="http://schemas.microsoft.com/office/drawing/2014/main" id="{999EA895-0B9F-4B34-B037-08F1A7229D11}"/>
+              </a:ext>
+            </a:extLst>
+          </p:cNvPr>
+          <p:cNvPicPr>
+            <a:picLocks noGrp="1" noChangeAspect="1"/>
+          </p:cNvPicPr>
+          <p:nvPr>
+            <p:ph idx="1"/>
+          </p:nvPr>
+        </p:nvPicPr>
+        <p:blipFill>
+          <a:blip r:embed="rId2"/>
+          <a:stretch>
+            <a:fillRect/>
+          </a:stretch>
+        </p:blipFill>
+        <p:spPr>
+          <a:xfrm>
+            <a:off x="3690937" y="1848644"/>
+            <a:ext cx="4810125" cy="4305300"/>
+          </a:xfrm>
+          <a:prstGeom prst="rect">
+            <a:avLst/>
+          </a:prstGeom>
+        </p:spPr>
+      </p:pic>
+    </p:spTree>
+    <p:extLst>
+      <p:ext uri="{BB962C8B-B14F-4D97-AF65-F5344CB8AC3E}">
+        <p14:creationId xmlns:p14="http://schemas.microsoft.com/office/powerpoint/2010/main" val="2220266272"/>
+      </p:ext>
+    </p:extLst>
+  </p:cSld>
+  <p:clrMapOvr>
+    <a:masterClrMapping/>
+  </p:clrMapOvr>
+</p:sld>
+</file>
+
+<file path=ppt/slides/slide16.xml><?xml version="1.0" encoding="utf-8"?>
+<p:sld xmlns:a="http://schemas.openxmlformats.org/drawingml/2006/main" xmlns:r="http://schemas.openxmlformats.org/officeDocument/2006/relationships" xmlns:p="http://schemas.openxmlformats.org/presentationml/2006/main">
+  <p:cSld>
+    <p:spTree>
+      <p:nvGrpSpPr>
+        <p:cNvPr id="1" name=""/>
+        <p:cNvGrpSpPr/>
+        <p:nvPr/>
+      </p:nvGrpSpPr>
+      <p:grpSpPr>
+        <a:xfrm>
+          <a:off x="0" y="0"/>
+          <a:ext cx="0" cy="0"/>
+          <a:chOff x="0" y="0"/>
+          <a:chExt cx="0" cy="0"/>
+        </a:xfrm>
+      </p:grpSpPr>
+      <p:sp>
+        <p:nvSpPr>
+          <p:cNvPr id="2" name="Title 1">
+            <a:extLst>
+              <a:ext uri="{FF2B5EF4-FFF2-40B4-BE49-F238E27FC236}">
+                <a16:creationId xmlns:a16="http://schemas.microsoft.com/office/drawing/2014/main" id="{A32ECA4C-E895-415B-937E-EECCBB638C31}"/>
+              </a:ext>
+            </a:extLst>
+          </p:cNvPr>
+          <p:cNvSpPr>
+            <a:spLocks noGrp="1"/>
+          </p:cNvSpPr>
+          <p:nvPr>
+            <p:ph type="title"/>
+          </p:nvPr>
+        </p:nvSpPr>
+        <p:spPr/>
+        <p:txBody>
+          <a:bodyPr/>
+          <a:lstStyle/>
+          <a:p>
+            <a:r>
+              <a:rPr lang="en-US">
+                <a:latin typeface="Times New Roman" panose="02020603050405020304" pitchFamily="18" charset="0"/>
+                <a:cs typeface="Times New Roman" panose="02020603050405020304" pitchFamily="18" charset="0"/>
+              </a:rPr>
+              <a:t>Nhận xét:</a:t>
+            </a:r>
+          </a:p>
+        </p:txBody>
+      </p:sp>
+      <p:sp>
+        <p:nvSpPr>
+          <p:cNvPr id="3" name="Content Placeholder 2">
+            <a:extLst>
+              <a:ext uri="{FF2B5EF4-FFF2-40B4-BE49-F238E27FC236}">
+                <a16:creationId xmlns:a16="http://schemas.microsoft.com/office/drawing/2014/main" id="{7289AB27-A04F-43C0-B683-438881E69443}"/>
+              </a:ext>
+            </a:extLst>
+          </p:cNvPr>
+          <p:cNvSpPr>
+            <a:spLocks noGrp="1"/>
+          </p:cNvSpPr>
+          <p:nvPr>
+            <p:ph idx="1"/>
+          </p:nvPr>
+        </p:nvSpPr>
+        <p:spPr/>
+        <p:txBody>
+          <a:bodyPr/>
+          <a:lstStyle/>
+          <a:p>
+            <a:r>
+              <a:rPr lang="vi-VN" b="1">
+                <a:latin typeface="+mj-lt"/>
+              </a:rPr>
+              <a:t>Recency</a:t>
+            </a:r>
+            <a:r>
+              <a:rPr lang="vi-VN">
+                <a:latin typeface="+mj-lt"/>
+              </a:rPr>
+              <a:t> có tương quan âm nhẹ với </a:t>
+            </a:r>
+            <a:r>
+              <a:rPr lang="vi-VN" b="1">
+                <a:latin typeface="+mj-lt"/>
+              </a:rPr>
+              <a:t>Frequency</a:t>
+            </a:r>
+            <a:r>
+              <a:rPr lang="vi-VN">
+                <a:latin typeface="+mj-lt"/>
+              </a:rPr>
+              <a:t> (-0.26) và </a:t>
+            </a:r>
+            <a:r>
+              <a:rPr lang="vi-VN" b="1">
+                <a:latin typeface="+mj-lt"/>
+              </a:rPr>
+              <a:t>Monetary</a:t>
+            </a:r>
+            <a:r>
+              <a:rPr lang="vi-VN">
+                <a:latin typeface="+mj-lt"/>
+              </a:rPr>
+              <a:t> (-0.18): khách mua gần đây thường mua nhiều hơn và chi tiêu nhiều hơn.</a:t>
+            </a:r>
+            <a:endParaRPr lang="en-US">
+              <a:latin typeface="+mj-lt"/>
+            </a:endParaRPr>
+          </a:p>
+          <a:p>
+            <a:r>
+              <a:rPr lang="vi-VN" b="1">
+                <a:latin typeface="+mj-lt"/>
+              </a:rPr>
+              <a:t>Frequency</a:t>
+            </a:r>
+            <a:r>
+              <a:rPr lang="vi-VN">
+                <a:latin typeface="+mj-lt"/>
+              </a:rPr>
+              <a:t> và </a:t>
+            </a:r>
+            <a:r>
+              <a:rPr lang="vi-VN" b="1">
+                <a:latin typeface="+mj-lt"/>
+              </a:rPr>
+              <a:t>Monetary</a:t>
+            </a:r>
+            <a:r>
+              <a:rPr lang="vi-VN">
+                <a:latin typeface="+mj-lt"/>
+              </a:rPr>
+              <a:t> có tương quan dương rất mạnh (0.71): khách mua nhiều lần thường cũng chi tiêu nhiều tiền.</a:t>
+            </a:r>
+            <a:endParaRPr lang="en-US">
+              <a:latin typeface="+mj-lt"/>
+            </a:endParaRPr>
+          </a:p>
+          <a:p>
+            <a:pPr marL="0" indent="0">
+              <a:buNone/>
+            </a:pPr>
+            <a:r>
+              <a:rPr lang="vi-VN">
+                <a:latin typeface="+mj-lt"/>
+              </a:rPr>
+              <a:t>=&gt; </a:t>
+            </a:r>
+            <a:r>
+              <a:rPr lang="vi-VN" b="1">
+                <a:latin typeface="+mj-lt"/>
+              </a:rPr>
+              <a:t>Recency</a:t>
+            </a:r>
+            <a:r>
+              <a:rPr lang="vi-VN">
+                <a:latin typeface="+mj-lt"/>
+              </a:rPr>
+              <a:t> ảnh hưởng ngược chiều, còn </a:t>
+            </a:r>
+            <a:r>
+              <a:rPr lang="vi-VN" b="1">
+                <a:latin typeface="+mj-lt"/>
+              </a:rPr>
+              <a:t>Frequency</a:t>
+            </a:r>
+            <a:r>
+              <a:rPr lang="vi-VN">
+                <a:latin typeface="+mj-lt"/>
+              </a:rPr>
+              <a:t> và Monetary có mối liên hệ chặt chẽ.</a:t>
+            </a:r>
+            <a:endParaRPr lang="en-US">
+              <a:latin typeface="+mj-lt"/>
+            </a:endParaRPr>
+          </a:p>
+        </p:txBody>
+      </p:sp>
+    </p:spTree>
+    <p:extLst>
+      <p:ext uri="{BB962C8B-B14F-4D97-AF65-F5344CB8AC3E}">
+        <p14:creationId xmlns:p14="http://schemas.microsoft.com/office/powerpoint/2010/main" val="1298985550"/>
+      </p:ext>
+    </p:extLst>
+  </p:cSld>
+  <p:clrMapOvr>
+    <a:masterClrMapping/>
+  </p:clrMapOvr>
+</p:sld>
+</file>
+
+<file path=ppt/slides/slide17.xml><?xml version="1.0" encoding="utf-8"?>
+<p:sld xmlns:a="http://schemas.openxmlformats.org/drawingml/2006/main" xmlns:r="http://schemas.openxmlformats.org/officeDocument/2006/relationships" xmlns:p="http://schemas.openxmlformats.org/presentationml/2006/main">
+  <p:cSld>
+    <p:spTree>
+      <p:nvGrpSpPr>
+        <p:cNvPr id="1" name=""/>
+        <p:cNvGrpSpPr/>
+        <p:nvPr/>
+      </p:nvGrpSpPr>
+      <p:grpSpPr>
+        <a:xfrm>
+          <a:off x="0" y="0"/>
+          <a:ext cx="0" cy="0"/>
+          <a:chOff x="0" y="0"/>
+          <a:chExt cx="0" cy="0"/>
+        </a:xfrm>
+      </p:grpSpPr>
+      <p:sp>
+        <p:nvSpPr>
+          <p:cNvPr id="2" name="Title 1">
+            <a:extLst>
+              <a:ext uri="{FF2B5EF4-FFF2-40B4-BE49-F238E27FC236}">
+                <a16:creationId xmlns:a16="http://schemas.microsoft.com/office/drawing/2014/main" id="{130DCC63-CDB3-4D2E-B920-23393431CD4F}"/>
+              </a:ext>
+            </a:extLst>
+          </p:cNvPr>
+          <p:cNvSpPr>
+            <a:spLocks noGrp="1"/>
+          </p:cNvSpPr>
+          <p:nvPr>
+            <p:ph type="title"/>
+          </p:nvPr>
+        </p:nvSpPr>
+        <p:spPr/>
+        <p:txBody>
+          <a:bodyPr/>
+          <a:lstStyle/>
+          <a:p>
+            <a:pPr algn="ctr"/>
+            <a:r>
+              <a:rPr lang="en-US">
+                <a:latin typeface="Times New Roman" panose="02020603050405020304" pitchFamily="18" charset="0"/>
+                <a:cs typeface="Times New Roman" panose="02020603050405020304" pitchFamily="18" charset="0"/>
+              </a:rPr>
+              <a:t>Biểu đồ scatter:</a:t>
+            </a:r>
+            <a:br>
+              <a:rPr lang="en-US">
+                <a:latin typeface="Times New Roman" panose="02020603050405020304" pitchFamily="18" charset="0"/>
+                <a:cs typeface="Times New Roman" panose="02020603050405020304" pitchFamily="18" charset="0"/>
+              </a:rPr>
+            </a:br>
+            <a:r>
+              <a:rPr lang="en-US" sz="3000">
+                <a:latin typeface="Times New Roman" panose="02020603050405020304" pitchFamily="18" charset="0"/>
+                <a:cs typeface="Times New Roman" panose="02020603050405020304" pitchFamily="18" charset="0"/>
+              </a:rPr>
+              <a:t>Giữa </a:t>
+            </a:r>
+            <a:r>
+              <a:rPr lang="en-US" sz="3000" b="1">
+                <a:latin typeface="Times New Roman" panose="02020603050405020304" pitchFamily="18" charset="0"/>
+                <a:cs typeface="Times New Roman" panose="02020603050405020304" pitchFamily="18" charset="0"/>
+              </a:rPr>
+              <a:t>Recency</a:t>
+            </a:r>
+            <a:r>
+              <a:rPr lang="en-US" sz="3000">
+                <a:latin typeface="Times New Roman" panose="02020603050405020304" pitchFamily="18" charset="0"/>
+                <a:cs typeface="Times New Roman" panose="02020603050405020304" pitchFamily="18" charset="0"/>
+              </a:rPr>
+              <a:t> và </a:t>
+            </a:r>
+            <a:r>
+              <a:rPr lang="en-US" sz="3000" b="1">
+                <a:latin typeface="Times New Roman" panose="02020603050405020304" pitchFamily="18" charset="0"/>
+                <a:cs typeface="Times New Roman" panose="02020603050405020304" pitchFamily="18" charset="0"/>
+              </a:rPr>
+              <a:t>Frequency</a:t>
+            </a:r>
+          </a:p>
+        </p:txBody>
+      </p:sp>
+      <p:pic>
+        <p:nvPicPr>
+          <p:cNvPr id="4" name="Content Placeholder 3">
+            <a:extLst>
+              <a:ext uri="{FF2B5EF4-FFF2-40B4-BE49-F238E27FC236}">
+                <a16:creationId xmlns:a16="http://schemas.microsoft.com/office/drawing/2014/main" id="{5E324A96-9064-4662-A2B0-CDE94FC09E4C}"/>
+              </a:ext>
+            </a:extLst>
+          </p:cNvPr>
+          <p:cNvPicPr>
+            <a:picLocks noGrp="1" noChangeAspect="1"/>
+          </p:cNvPicPr>
+          <p:nvPr>
+            <p:ph idx="1"/>
+          </p:nvPr>
+        </p:nvPicPr>
+        <p:blipFill>
+          <a:blip r:embed="rId2"/>
+          <a:stretch>
+            <a:fillRect/>
+          </a:stretch>
+        </p:blipFill>
+        <p:spPr>
+          <a:xfrm>
+            <a:off x="3239572" y="1825625"/>
+            <a:ext cx="5712856" cy="4351338"/>
+          </a:xfrm>
+          <a:prstGeom prst="rect">
+            <a:avLst/>
+          </a:prstGeom>
+        </p:spPr>
+      </p:pic>
+    </p:spTree>
+    <p:extLst>
+      <p:ext uri="{BB962C8B-B14F-4D97-AF65-F5344CB8AC3E}">
+        <p14:creationId xmlns:p14="http://schemas.microsoft.com/office/powerpoint/2010/main" val="781326843"/>
+      </p:ext>
+    </p:extLst>
+  </p:cSld>
+  <p:clrMapOvr>
+    <a:masterClrMapping/>
+  </p:clrMapOvr>
+</p:sld>
+</file>
+
+<file path=ppt/slides/slide18.xml><?xml version="1.0" encoding="utf-8"?>
+<p:sld xmlns:a="http://schemas.openxmlformats.org/drawingml/2006/main" xmlns:r="http://schemas.openxmlformats.org/officeDocument/2006/relationships" xmlns:p="http://schemas.openxmlformats.org/presentationml/2006/main">
+  <p:cSld>
+    <p:spTree>
+      <p:nvGrpSpPr>
+        <p:cNvPr id="1" name=""/>
+        <p:cNvGrpSpPr/>
+        <p:nvPr/>
+      </p:nvGrpSpPr>
+      <p:grpSpPr>
+        <a:xfrm>
+          <a:off x="0" y="0"/>
+          <a:ext cx="0" cy="0"/>
+          <a:chOff x="0" y="0"/>
+          <a:chExt cx="0" cy="0"/>
+        </a:xfrm>
+      </p:grpSpPr>
+      <p:sp>
+        <p:nvSpPr>
+          <p:cNvPr id="2" name="Title 1">
+            <a:extLst>
+              <a:ext uri="{FF2B5EF4-FFF2-40B4-BE49-F238E27FC236}">
+                <a16:creationId xmlns:a16="http://schemas.microsoft.com/office/drawing/2014/main" id="{4B9EBBBE-F04D-40FE-9409-441E08DEF017}"/>
+              </a:ext>
+            </a:extLst>
+          </p:cNvPr>
+          <p:cNvSpPr>
+            <a:spLocks noGrp="1"/>
+          </p:cNvSpPr>
+          <p:nvPr>
+            <p:ph type="title"/>
+          </p:nvPr>
+        </p:nvSpPr>
+        <p:spPr/>
+        <p:txBody>
+          <a:bodyPr>
+            <a:normAutofit/>
+          </a:bodyPr>
+          <a:lstStyle/>
+          <a:p>
+            <a:pPr algn="ctr"/>
+            <a:r>
+              <a:rPr lang="en-US" sz="3000">
+                <a:latin typeface="Times New Roman" panose="02020603050405020304" pitchFamily="18" charset="0"/>
+                <a:cs typeface="Times New Roman" panose="02020603050405020304" pitchFamily="18" charset="0"/>
+              </a:rPr>
+              <a:t>Giữa </a:t>
+            </a:r>
+            <a:r>
+              <a:rPr lang="en-US" sz="3000" b="1">
+                <a:latin typeface="Times New Roman" panose="02020603050405020304" pitchFamily="18" charset="0"/>
+                <a:cs typeface="Times New Roman" panose="02020603050405020304" pitchFamily="18" charset="0"/>
+              </a:rPr>
+              <a:t>Frequency</a:t>
+            </a:r>
+            <a:r>
+              <a:rPr lang="en-US" sz="3000">
+                <a:latin typeface="Times New Roman" panose="02020603050405020304" pitchFamily="18" charset="0"/>
+                <a:cs typeface="Times New Roman" panose="02020603050405020304" pitchFamily="18" charset="0"/>
+              </a:rPr>
+              <a:t> và </a:t>
+            </a:r>
+            <a:r>
+              <a:rPr lang="en-US" sz="3000" b="1">
+                <a:latin typeface="Times New Roman" panose="02020603050405020304" pitchFamily="18" charset="0"/>
+                <a:cs typeface="Times New Roman" panose="02020603050405020304" pitchFamily="18" charset="0"/>
+              </a:rPr>
+              <a:t>Monetary</a:t>
+            </a:r>
+          </a:p>
+        </p:txBody>
+      </p:sp>
+      <p:pic>
+        <p:nvPicPr>
+          <p:cNvPr id="4" name="Content Placeholder 3">
+            <a:extLst>
+              <a:ext uri="{FF2B5EF4-FFF2-40B4-BE49-F238E27FC236}">
+                <a16:creationId xmlns:a16="http://schemas.microsoft.com/office/drawing/2014/main" id="{243243B7-4D8B-4D4C-B4F9-B636C76DF9B8}"/>
+              </a:ext>
+            </a:extLst>
+          </p:cNvPr>
+          <p:cNvPicPr>
+            <a:picLocks noGrp="1" noChangeAspect="1"/>
+          </p:cNvPicPr>
+          <p:nvPr>
+            <p:ph idx="1"/>
+          </p:nvPr>
+        </p:nvPicPr>
+        <p:blipFill>
+          <a:blip r:embed="rId2"/>
+          <a:stretch>
+            <a:fillRect/>
+          </a:stretch>
+        </p:blipFill>
+        <p:spPr>
+          <a:xfrm>
+            <a:off x="3119979" y="1825625"/>
+            <a:ext cx="5952041" cy="4351338"/>
+          </a:xfrm>
+          <a:prstGeom prst="rect">
+            <a:avLst/>
+          </a:prstGeom>
+        </p:spPr>
+      </p:pic>
+    </p:spTree>
+    <p:extLst>
+      <p:ext uri="{BB962C8B-B14F-4D97-AF65-F5344CB8AC3E}">
+        <p14:creationId xmlns:p14="http://schemas.microsoft.com/office/powerpoint/2010/main" val="2650463780"/>
+      </p:ext>
+    </p:extLst>
+  </p:cSld>
+  <p:clrMapOvr>
+    <a:masterClrMapping/>
+  </p:clrMapOvr>
+</p:sld>
+</file>
+
+<file path=ppt/slides/slide19.xml><?xml version="1.0" encoding="utf-8"?>
+<p:sld xmlns:a="http://schemas.openxmlformats.org/drawingml/2006/main" xmlns:r="http://schemas.openxmlformats.org/officeDocument/2006/relationships" xmlns:p="http://schemas.openxmlformats.org/presentationml/2006/main">
+  <p:cSld>
+    <p:spTree>
+      <p:nvGrpSpPr>
+        <p:cNvPr id="1" name=""/>
+        <p:cNvGrpSpPr/>
+        <p:nvPr/>
+      </p:nvGrpSpPr>
+      <p:grpSpPr>
+        <a:xfrm>
+          <a:off x="0" y="0"/>
+          <a:ext cx="0" cy="0"/>
+          <a:chOff x="0" y="0"/>
+          <a:chExt cx="0" cy="0"/>
+        </a:xfrm>
+      </p:grpSpPr>
+      <p:sp>
+        <p:nvSpPr>
+          <p:cNvPr id="2" name="Title 1">
+            <a:extLst>
+              <a:ext uri="{FF2B5EF4-FFF2-40B4-BE49-F238E27FC236}">
+                <a16:creationId xmlns:a16="http://schemas.microsoft.com/office/drawing/2014/main" id="{7281A458-24F2-44BE-A3BB-7D99F9F0A90F}"/>
+              </a:ext>
+            </a:extLst>
+          </p:cNvPr>
+          <p:cNvSpPr>
+            <a:spLocks noGrp="1"/>
+          </p:cNvSpPr>
+          <p:nvPr>
+            <p:ph type="title"/>
+          </p:nvPr>
+        </p:nvSpPr>
+        <p:spPr/>
+        <p:txBody>
+          <a:bodyPr/>
+          <a:lstStyle/>
+          <a:p>
+            <a:r>
+              <a:rPr lang="en-US">
+                <a:latin typeface="Times New Roman" panose="02020603050405020304" pitchFamily="18" charset="0"/>
+                <a:cs typeface="Times New Roman" panose="02020603050405020304" pitchFamily="18" charset="0"/>
+              </a:rPr>
+              <a:t>Nhận xét:</a:t>
+            </a:r>
+          </a:p>
+        </p:txBody>
+      </p:sp>
+      <p:sp>
+        <p:nvSpPr>
+          <p:cNvPr id="3" name="Content Placeholder 2">
+            <a:extLst>
+              <a:ext uri="{FF2B5EF4-FFF2-40B4-BE49-F238E27FC236}">
+                <a16:creationId xmlns:a16="http://schemas.microsoft.com/office/drawing/2014/main" id="{5F673DA3-3418-4A58-A948-CC674682D6FA}"/>
+              </a:ext>
+            </a:extLst>
+          </p:cNvPr>
+          <p:cNvSpPr>
+            <a:spLocks noGrp="1"/>
+          </p:cNvSpPr>
+          <p:nvPr>
+            <p:ph idx="1"/>
+          </p:nvPr>
+        </p:nvSpPr>
+        <p:spPr/>
+        <p:txBody>
+          <a:bodyPr/>
+          <a:lstStyle/>
+          <a:p>
+            <a:r>
+              <a:rPr lang="vi-VN" b="1">
+                <a:latin typeface="+mj-lt"/>
+              </a:rPr>
+              <a:t>Recency</a:t>
+            </a:r>
+            <a:r>
+              <a:rPr lang="vi-VN">
+                <a:latin typeface="+mj-lt"/>
+              </a:rPr>
+              <a:t> vs </a:t>
+            </a:r>
+            <a:r>
+              <a:rPr lang="vi-VN" b="1">
+                <a:latin typeface="+mj-lt"/>
+              </a:rPr>
+              <a:t>Frequency</a:t>
+            </a:r>
+            <a:r>
+              <a:rPr lang="vi-VN">
+                <a:latin typeface="+mj-lt"/>
+              </a:rPr>
+              <a:t>: Có xu hướng nghịch biến, khách hàng mua gần đây (</a:t>
+            </a:r>
+            <a:r>
+              <a:rPr lang="vi-VN" b="1">
+                <a:latin typeface="+mj-lt"/>
+              </a:rPr>
+              <a:t>Recency</a:t>
+            </a:r>
+            <a:r>
+              <a:rPr lang="vi-VN">
+                <a:latin typeface="+mj-lt"/>
+              </a:rPr>
+              <a:t> nhỏ) thường mua nhiều lần hơn. Khi </a:t>
+            </a:r>
+            <a:r>
+              <a:rPr lang="vi-VN" b="1">
+                <a:latin typeface="+mj-lt"/>
+              </a:rPr>
+              <a:t>Recency</a:t>
+            </a:r>
+            <a:r>
+              <a:rPr lang="vi-VN">
+                <a:latin typeface="+mj-lt"/>
+              </a:rPr>
+              <a:t> tăng, </a:t>
+            </a:r>
+            <a:r>
+              <a:rPr lang="vi-VN" b="1">
+                <a:latin typeface="+mj-lt"/>
+              </a:rPr>
+              <a:t>Frequency</a:t>
+            </a:r>
+            <a:r>
+              <a:rPr lang="vi-VN">
+                <a:latin typeface="+mj-lt"/>
+              </a:rPr>
+              <a:t> giảm rõ rệt.</a:t>
+            </a:r>
+            <a:endParaRPr lang="en-US">
+              <a:latin typeface="+mj-lt"/>
+            </a:endParaRPr>
+          </a:p>
+          <a:p>
+            <a:r>
+              <a:rPr lang="vi-VN" b="1">
+                <a:latin typeface="+mj-lt"/>
+              </a:rPr>
+              <a:t>Frequency</a:t>
+            </a:r>
+            <a:r>
+              <a:rPr lang="vi-VN">
+                <a:latin typeface="+mj-lt"/>
+              </a:rPr>
+              <a:t> vs </a:t>
+            </a:r>
+            <a:r>
+              <a:rPr lang="vi-VN" b="1">
+                <a:latin typeface="+mj-lt"/>
+              </a:rPr>
+              <a:t>Monetary</a:t>
+            </a:r>
+            <a:r>
+              <a:rPr lang="vi-VN">
+                <a:latin typeface="+mj-lt"/>
+              </a:rPr>
+              <a:t>: Có mối quan hệ đồng biến, khách mua hàng nhiều lần thường chi tiêu nhiều hơn. Tuy nhiên, tồn tại một số </a:t>
+            </a:r>
+            <a:r>
+              <a:rPr lang="vi-VN" b="1">
+                <a:latin typeface="+mj-lt"/>
+              </a:rPr>
+              <a:t>outlier</a:t>
+            </a:r>
+            <a:r>
+              <a:rPr lang="vi-VN">
+                <a:latin typeface="+mj-lt"/>
+              </a:rPr>
+              <a:t> với chi tiêu cực lớn so với số đông.</a:t>
+            </a:r>
+            <a:endParaRPr lang="en-US">
+              <a:latin typeface="+mj-lt"/>
+            </a:endParaRPr>
+          </a:p>
+          <a:p>
+            <a:pPr marL="0" indent="0">
+              <a:buNone/>
+            </a:pPr>
+            <a:r>
+              <a:rPr lang="vi-VN">
+                <a:latin typeface="+mj-lt"/>
+              </a:rPr>
+              <a:t>=&gt; Nhìn chung, dữ liệu phản ánh đúng logic kinh doanh: khách hàng mua gần đây và mua nhiều lần thì cũng thường là nhóm mang lại doanh thu cao.</a:t>
+            </a:r>
+            <a:endParaRPr lang="en-US">
+              <a:latin typeface="+mj-lt"/>
+            </a:endParaRPr>
+          </a:p>
+        </p:txBody>
+      </p:sp>
+    </p:spTree>
+    <p:extLst>
+      <p:ext uri="{BB962C8B-B14F-4D97-AF65-F5344CB8AC3E}">
+        <p14:creationId xmlns:p14="http://schemas.microsoft.com/office/powerpoint/2010/main" val="1259663153"/>
+      </p:ext>
+    </p:extLst>
+  </p:cSld>
+  <p:clrMapOvr>
+    <a:masterClrMapping/>
+  </p:clrMapOvr>
+</p:sld>
+</file>
+
 <file path=ppt/slides/slide2.xml><?xml version="1.0" encoding="utf-8"?>
 <p:sld xmlns:a="http://schemas.openxmlformats.org/drawingml/2006/main" xmlns:r="http://schemas.openxmlformats.org/officeDocument/2006/relationships" xmlns:p="http://schemas.openxmlformats.org/presentationml/2006/main">
   <p:cSld>
@@ -3445,7 +4778,7 @@
                 <a:latin typeface="Times New Roman" panose="02020603050405020304" pitchFamily="18" charset="0"/>
                 <a:cs typeface="Times New Roman" panose="02020603050405020304" pitchFamily="18" charset="0"/>
               </a:rPr>
-              <a:t>I. Dữ liệu</a:t>
+              <a:t>I. Dữ liệu:</a:t>
             </a:r>
           </a:p>
         </p:txBody>
@@ -3476,6 +4809,18 @@
           <a:bodyPr/>
           <a:lstStyle/>
           <a:p>
+            <a:pPr marL="0" indent="0">
+              <a:buNone/>
+            </a:pPr>
+            <a:r>
+              <a:rPr lang="en-US" sz="3000">
+                <a:latin typeface="Times New Roman" panose="02020603050405020304" pitchFamily="18" charset="0"/>
+                <a:cs typeface="Times New Roman" panose="02020603050405020304" pitchFamily="18" charset="0"/>
+              </a:rPr>
+              <a:t>1. Mô tả dữ liệu:</a:t>
+            </a:r>
+          </a:p>
+          <a:p>
             <a:r>
               <a:rPr lang="en-US">
                 <a:latin typeface="Times New Roman" panose="02020603050405020304" pitchFamily="18" charset="0"/>
@@ -3554,6 +4899,2386 @@
     <p:extLst>
       <p:ext uri="{BB962C8B-B14F-4D97-AF65-F5344CB8AC3E}">
         <p14:creationId xmlns:p14="http://schemas.microsoft.com/office/powerpoint/2010/main" val="2010581348"/>
+      </p:ext>
+    </p:extLst>
+  </p:cSld>
+  <p:clrMapOvr>
+    <a:masterClrMapping/>
+  </p:clrMapOvr>
+</p:sld>
+</file>
+
+<file path=ppt/slides/slide20.xml><?xml version="1.0" encoding="utf-8"?>
+<p:sld xmlns:a="http://schemas.openxmlformats.org/drawingml/2006/main" xmlns:r="http://schemas.openxmlformats.org/officeDocument/2006/relationships" xmlns:p="http://schemas.openxmlformats.org/presentationml/2006/main">
+  <p:cSld>
+    <p:spTree>
+      <p:nvGrpSpPr>
+        <p:cNvPr id="1" name=""/>
+        <p:cNvGrpSpPr/>
+        <p:nvPr/>
+      </p:nvGrpSpPr>
+      <p:grpSpPr>
+        <a:xfrm>
+          <a:off x="0" y="0"/>
+          <a:ext cx="0" cy="0"/>
+          <a:chOff x="0" y="0"/>
+          <a:chExt cx="0" cy="0"/>
+        </a:xfrm>
+      </p:grpSpPr>
+      <p:sp>
+        <p:nvSpPr>
+          <p:cNvPr id="2" name="Title 1">
+            <a:extLst>
+              <a:ext uri="{FF2B5EF4-FFF2-40B4-BE49-F238E27FC236}">
+                <a16:creationId xmlns:a16="http://schemas.microsoft.com/office/drawing/2014/main" id="{ED58D64F-9D33-43BF-BBE8-F8D4278D28A3}"/>
+              </a:ext>
+            </a:extLst>
+          </p:cNvPr>
+          <p:cNvSpPr>
+            <a:spLocks noGrp="1"/>
+          </p:cNvSpPr>
+          <p:nvPr>
+            <p:ph type="title"/>
+          </p:nvPr>
+        </p:nvSpPr>
+        <p:spPr>
+          <a:xfrm>
+            <a:off x="838200" y="365126"/>
+            <a:ext cx="10515600" cy="585134"/>
+          </a:xfrm>
+        </p:spPr>
+        <p:txBody>
+          <a:bodyPr>
+            <a:normAutofit/>
+          </a:bodyPr>
+          <a:lstStyle/>
+          <a:p>
+            <a:r>
+              <a:rPr lang="en-US" sz="3000">
+                <a:latin typeface="Times New Roman" panose="02020603050405020304" pitchFamily="18" charset="0"/>
+                <a:cs typeface="Times New Roman" panose="02020603050405020304" pitchFamily="18" charset="0"/>
+              </a:rPr>
+              <a:t>5. Gán nhãn kinh doanh dựa trên RFM</a:t>
+            </a:r>
+          </a:p>
+        </p:txBody>
+      </p:sp>
+      <p:sp>
+        <p:nvSpPr>
+          <p:cNvPr id="3" name="Content Placeholder 2">
+            <a:extLst>
+              <a:ext uri="{FF2B5EF4-FFF2-40B4-BE49-F238E27FC236}">
+                <a16:creationId xmlns:a16="http://schemas.microsoft.com/office/drawing/2014/main" id="{FCCC1C48-444F-42FC-BA2B-D35DB1A4A60B}"/>
+              </a:ext>
+            </a:extLst>
+          </p:cNvPr>
+          <p:cNvSpPr>
+            <a:spLocks noGrp="1"/>
+          </p:cNvSpPr>
+          <p:nvPr>
+            <p:ph idx="1"/>
+          </p:nvPr>
+        </p:nvSpPr>
+        <p:spPr>
+          <a:xfrm>
+            <a:off x="838200" y="950260"/>
+            <a:ext cx="5257800" cy="5226703"/>
+          </a:xfrm>
+        </p:spPr>
+        <p:txBody>
+          <a:bodyPr>
+            <a:normAutofit/>
+          </a:bodyPr>
+          <a:lstStyle/>
+          <a:p>
+            <a:pPr marL="0" indent="0">
+              <a:buNone/>
+            </a:pPr>
+            <a:r>
+              <a:rPr lang="vi-VN" sz="2000">
+                <a:latin typeface="+mj-lt"/>
+              </a:rPr>
+              <a:t>1. </a:t>
+            </a:r>
+            <a:r>
+              <a:rPr lang="vi-VN" sz="2000" b="1">
+                <a:latin typeface="+mj-lt"/>
+              </a:rPr>
+              <a:t>Loyal (Trung thành)   </a:t>
+            </a:r>
+            <a:endParaRPr lang="en-US" sz="2000" b="1">
+              <a:latin typeface="+mj-lt"/>
+            </a:endParaRPr>
+          </a:p>
+          <a:p>
+            <a:r>
+              <a:rPr lang="vi-VN" sz="2000">
+                <a:latin typeface="+mj-lt"/>
+              </a:rPr>
+              <a:t>Recency thấp (mới mua gần đây).   </a:t>
+            </a:r>
+            <a:endParaRPr lang="en-US" sz="2000">
+              <a:latin typeface="+mj-lt"/>
+            </a:endParaRPr>
+          </a:p>
+          <a:p>
+            <a:r>
+              <a:rPr lang="vi-VN" sz="2000">
+                <a:latin typeface="+mj-lt"/>
+              </a:rPr>
+              <a:t>Frequency cao (mua thường xuyên).    </a:t>
+            </a:r>
+            <a:endParaRPr lang="en-US" sz="2000">
+              <a:latin typeface="+mj-lt"/>
+            </a:endParaRPr>
+          </a:p>
+          <a:p>
+            <a:r>
+              <a:rPr lang="vi-VN" sz="2000">
+                <a:latin typeface="+mj-lt"/>
+              </a:rPr>
+              <a:t>Monetary cao (chi tiêu nhiều).    </a:t>
+            </a:r>
+            <a:endParaRPr lang="en-US" sz="2000">
+              <a:latin typeface="+mj-lt"/>
+            </a:endParaRPr>
+          </a:p>
+          <a:p>
+            <a:pPr marL="0" indent="0">
+              <a:buNone/>
+            </a:pPr>
+            <a:r>
+              <a:rPr lang="vi-VN" sz="2000">
+                <a:latin typeface="+mj-lt"/>
+              </a:rPr>
+              <a:t>=&gt; Đây là nhóm VIP cần giữ chân, chăm sóc đặc biệt.</a:t>
+            </a:r>
+            <a:endParaRPr lang="en-US" sz="2000">
+              <a:latin typeface="+mj-lt"/>
+            </a:endParaRPr>
+          </a:p>
+          <a:p>
+            <a:pPr marL="0" indent="0">
+              <a:buNone/>
+            </a:pPr>
+            <a:r>
+              <a:rPr lang="vi-VN" sz="2000">
+                <a:latin typeface="+mj-lt"/>
+              </a:rPr>
+              <a:t>2. </a:t>
+            </a:r>
+            <a:r>
+              <a:rPr lang="vi-VN" sz="2000" b="1">
+                <a:latin typeface="+mj-lt"/>
+              </a:rPr>
+              <a:t>Churn (Rời bỏ)    </a:t>
+            </a:r>
+            <a:endParaRPr lang="en-US" sz="2000" b="1">
+              <a:latin typeface="+mj-lt"/>
+            </a:endParaRPr>
+          </a:p>
+          <a:p>
+            <a:r>
+              <a:rPr lang="vi-VN" sz="2000">
+                <a:latin typeface="+mj-lt"/>
+              </a:rPr>
+              <a:t>Recency cao (lâu rồi chưa quay lại).    </a:t>
+            </a:r>
+            <a:endParaRPr lang="en-US" sz="2000">
+              <a:latin typeface="+mj-lt"/>
+            </a:endParaRPr>
+          </a:p>
+          <a:p>
+            <a:r>
+              <a:rPr lang="vi-VN" sz="2000">
+                <a:latin typeface="+mj-lt"/>
+              </a:rPr>
+              <a:t>Frequency thấp (ít mua).    </a:t>
+            </a:r>
+            <a:endParaRPr lang="en-US" sz="2000">
+              <a:latin typeface="+mj-lt"/>
+            </a:endParaRPr>
+          </a:p>
+          <a:p>
+            <a:r>
+              <a:rPr lang="vi-VN" sz="2000">
+                <a:latin typeface="+mj-lt"/>
+              </a:rPr>
+              <a:t>Monetary thấp (chi tiêu ít).</a:t>
+            </a:r>
+            <a:endParaRPr lang="en-US" sz="2000">
+              <a:latin typeface="+mj-lt"/>
+            </a:endParaRPr>
+          </a:p>
+          <a:p>
+            <a:pPr marL="0" indent="0">
+              <a:buNone/>
+            </a:pPr>
+            <a:r>
+              <a:rPr lang="vi-VN" sz="2000">
+                <a:latin typeface="+mj-lt"/>
+              </a:rPr>
+              <a:t>=&gt; Nhóm có nguy cơ mất khách, cần chiến dịch khuyến mãi để kéo lại</a:t>
+            </a:r>
+            <a:endParaRPr lang="en-US" sz="2000">
+              <a:latin typeface="+mj-lt"/>
+            </a:endParaRPr>
+          </a:p>
+        </p:txBody>
+      </p:sp>
+      <p:sp>
+        <p:nvSpPr>
+          <p:cNvPr id="5" name="TextBox 4">
+            <a:extLst>
+              <a:ext uri="{FF2B5EF4-FFF2-40B4-BE49-F238E27FC236}">
+                <a16:creationId xmlns:a16="http://schemas.microsoft.com/office/drawing/2014/main" id="{BF8E0599-E002-4A71-9902-2ACE84C2CC8C}"/>
+              </a:ext>
+            </a:extLst>
+          </p:cNvPr>
+          <p:cNvSpPr txBox="1"/>
+          <p:nvPr/>
+        </p:nvSpPr>
+        <p:spPr>
+          <a:xfrm>
+            <a:off x="6321204" y="950260"/>
+            <a:ext cx="5032596" cy="3785652"/>
+          </a:xfrm>
+          <a:prstGeom prst="rect">
+            <a:avLst/>
+          </a:prstGeom>
+          <a:noFill/>
+        </p:spPr>
+        <p:txBody>
+          <a:bodyPr wrap="square" rtlCol="0">
+            <a:spAutoFit/>
+          </a:bodyPr>
+          <a:lstStyle/>
+          <a:p>
+            <a:r>
+              <a:rPr lang="vi-VN" sz="2000">
+                <a:latin typeface="+mj-lt"/>
+              </a:rPr>
+              <a:t>3 </a:t>
+            </a:r>
+            <a:r>
+              <a:rPr lang="vi-VN" sz="2000" b="1">
+                <a:latin typeface="+mj-lt"/>
+              </a:rPr>
+              <a:t>New Customers (Khách mới)  </a:t>
+            </a:r>
+            <a:endParaRPr lang="en-US" sz="2000" b="1">
+              <a:latin typeface="+mj-lt"/>
+            </a:endParaRPr>
+          </a:p>
+          <a:p>
+            <a:pPr marL="342900" indent="-342900">
+              <a:buFont typeface="Arial" panose="020B0604020202020204" pitchFamily="34" charset="0"/>
+              <a:buChar char="•"/>
+            </a:pPr>
+            <a:r>
+              <a:rPr lang="vi-VN" sz="2000">
+                <a:latin typeface="+mj-lt"/>
+              </a:rPr>
+              <a:t>Recency thấp (vừa mới mua gần đây).    </a:t>
+            </a:r>
+            <a:endParaRPr lang="en-US" sz="2000">
+              <a:latin typeface="+mj-lt"/>
+            </a:endParaRPr>
+          </a:p>
+          <a:p>
+            <a:pPr marL="342900" indent="-342900">
+              <a:buFont typeface="Arial" panose="020B0604020202020204" pitchFamily="34" charset="0"/>
+              <a:buChar char="•"/>
+            </a:pPr>
+            <a:r>
+              <a:rPr lang="vi-VN" sz="2000">
+                <a:latin typeface="+mj-lt"/>
+              </a:rPr>
+              <a:t>Frequency thấp (chưa mua nhiều).    </a:t>
+            </a:r>
+            <a:endParaRPr lang="en-US" sz="2000">
+              <a:latin typeface="+mj-lt"/>
+            </a:endParaRPr>
+          </a:p>
+          <a:p>
+            <a:pPr marL="342900" indent="-342900">
+              <a:buFont typeface="Arial" panose="020B0604020202020204" pitchFamily="34" charset="0"/>
+              <a:buChar char="•"/>
+            </a:pPr>
+            <a:r>
+              <a:rPr lang="vi-VN" sz="2000">
+                <a:latin typeface="+mj-lt"/>
+              </a:rPr>
+              <a:t>Monetary chưa cao.</a:t>
+            </a:r>
+            <a:endParaRPr lang="en-US" sz="2000">
+              <a:latin typeface="+mj-lt"/>
+            </a:endParaRPr>
+          </a:p>
+          <a:p>
+            <a:r>
+              <a:rPr lang="en-US" sz="2000">
+                <a:latin typeface="+mj-lt"/>
+              </a:rPr>
+              <a:t>=&gt;</a:t>
+            </a:r>
+            <a:r>
+              <a:rPr lang="vi-VN" sz="2000">
+                <a:latin typeface="+mj-lt"/>
+              </a:rPr>
+              <a:t>Nhóm này cần nuôi dưỡng để biến thành khách trung thành.</a:t>
+            </a:r>
+            <a:endParaRPr lang="en-US" sz="2000">
+              <a:latin typeface="+mj-lt"/>
+            </a:endParaRPr>
+          </a:p>
+          <a:p>
+            <a:r>
+              <a:rPr lang="vi-VN" sz="2000">
+                <a:latin typeface="+mj-lt"/>
+              </a:rPr>
+              <a:t> 4. </a:t>
+            </a:r>
+            <a:r>
+              <a:rPr lang="vi-VN" sz="2000" b="1">
+                <a:latin typeface="+mj-lt"/>
+              </a:rPr>
+              <a:t>Potential (Tiềm năng)    </a:t>
+            </a:r>
+            <a:endParaRPr lang="en-US" sz="2000" b="1">
+              <a:latin typeface="+mj-lt"/>
+            </a:endParaRPr>
+          </a:p>
+          <a:p>
+            <a:pPr marL="342900" indent="-342900">
+              <a:buFont typeface="Arial" panose="020B0604020202020204" pitchFamily="34" charset="0"/>
+              <a:buChar char="•"/>
+            </a:pPr>
+            <a:r>
+              <a:rPr lang="vi-VN" sz="2000">
+                <a:latin typeface="+mj-lt"/>
+              </a:rPr>
+              <a:t>Recency trung bình.    </a:t>
+            </a:r>
+            <a:endParaRPr lang="en-US" sz="2000">
+              <a:latin typeface="+mj-lt"/>
+            </a:endParaRPr>
+          </a:p>
+          <a:p>
+            <a:pPr marL="342900" indent="-342900">
+              <a:buFont typeface="Arial" panose="020B0604020202020204" pitchFamily="34" charset="0"/>
+              <a:buChar char="•"/>
+            </a:pPr>
+            <a:r>
+              <a:rPr lang="vi-VN" sz="2000">
+                <a:latin typeface="+mj-lt"/>
+              </a:rPr>
+              <a:t>Frequency trung bình.    </a:t>
+            </a:r>
+            <a:endParaRPr lang="en-US" sz="2000">
+              <a:latin typeface="+mj-lt"/>
+            </a:endParaRPr>
+          </a:p>
+          <a:p>
+            <a:pPr marL="342900" indent="-342900">
+              <a:buFont typeface="Arial" panose="020B0604020202020204" pitchFamily="34" charset="0"/>
+              <a:buChar char="•"/>
+            </a:pPr>
+            <a:r>
+              <a:rPr lang="vi-VN" sz="2000">
+                <a:latin typeface="+mj-lt"/>
+              </a:rPr>
+              <a:t>Monetary trung bình.</a:t>
+            </a:r>
+            <a:endParaRPr lang="en-US" sz="2000">
+              <a:latin typeface="+mj-lt"/>
+            </a:endParaRPr>
+          </a:p>
+          <a:p>
+            <a:r>
+              <a:rPr lang="vi-VN" sz="2000">
+                <a:latin typeface="+mj-lt"/>
+              </a:rPr>
+              <a:t>=&gt; Nhóm có khả năng tăng trưởng, cần thúc đẩy bằng marketing/cross-sell.</a:t>
+            </a:r>
+            <a:endParaRPr lang="en-US" sz="2000">
+              <a:latin typeface="+mj-lt"/>
+            </a:endParaRPr>
+          </a:p>
+        </p:txBody>
+      </p:sp>
+    </p:spTree>
+    <p:extLst>
+      <p:ext uri="{BB962C8B-B14F-4D97-AF65-F5344CB8AC3E}">
+        <p14:creationId xmlns:p14="http://schemas.microsoft.com/office/powerpoint/2010/main" val="1367134751"/>
+      </p:ext>
+    </p:extLst>
+  </p:cSld>
+  <p:clrMapOvr>
+    <a:masterClrMapping/>
+  </p:clrMapOvr>
+</p:sld>
+</file>
+
+<file path=ppt/slides/slide21.xml><?xml version="1.0" encoding="utf-8"?>
+<p:sld xmlns:a="http://schemas.openxmlformats.org/drawingml/2006/main" xmlns:r="http://schemas.openxmlformats.org/officeDocument/2006/relationships" xmlns:p="http://schemas.openxmlformats.org/presentationml/2006/main">
+  <p:cSld>
+    <p:spTree>
+      <p:nvGrpSpPr>
+        <p:cNvPr id="1" name=""/>
+        <p:cNvGrpSpPr/>
+        <p:nvPr/>
+      </p:nvGrpSpPr>
+      <p:grpSpPr>
+        <a:xfrm>
+          <a:off x="0" y="0"/>
+          <a:ext cx="0" cy="0"/>
+          <a:chOff x="0" y="0"/>
+          <a:chExt cx="0" cy="0"/>
+        </a:xfrm>
+      </p:grpSpPr>
+      <p:sp>
+        <p:nvSpPr>
+          <p:cNvPr id="2" name="Title 1">
+            <a:extLst>
+              <a:ext uri="{FF2B5EF4-FFF2-40B4-BE49-F238E27FC236}">
+                <a16:creationId xmlns:a16="http://schemas.microsoft.com/office/drawing/2014/main" id="{DAA9E343-A3B0-4DA7-A2C0-738750F8FB6B}"/>
+              </a:ext>
+            </a:extLst>
+          </p:cNvPr>
+          <p:cNvSpPr>
+            <a:spLocks noGrp="1"/>
+          </p:cNvSpPr>
+          <p:nvPr>
+            <p:ph type="title"/>
+          </p:nvPr>
+        </p:nvSpPr>
+        <p:spPr/>
+        <p:txBody>
+          <a:bodyPr/>
+          <a:lstStyle/>
+          <a:p>
+            <a:pPr algn="ctr"/>
+            <a:r>
+              <a:rPr lang="en-US">
+                <a:latin typeface="Times New Roman" panose="02020603050405020304" pitchFamily="18" charset="0"/>
+                <a:cs typeface="Times New Roman" panose="02020603050405020304" pitchFamily="18" charset="0"/>
+              </a:rPr>
+              <a:t>Sau khi gán nhãn:</a:t>
+            </a:r>
+          </a:p>
+        </p:txBody>
+      </p:sp>
+      <p:pic>
+        <p:nvPicPr>
+          <p:cNvPr id="4" name="Content Placeholder 3">
+            <a:extLst>
+              <a:ext uri="{FF2B5EF4-FFF2-40B4-BE49-F238E27FC236}">
+                <a16:creationId xmlns:a16="http://schemas.microsoft.com/office/drawing/2014/main" id="{3BA13C8F-1FA5-4DF7-A260-07DA33287D8B}"/>
+              </a:ext>
+            </a:extLst>
+          </p:cNvPr>
+          <p:cNvPicPr>
+            <a:picLocks noGrp="1" noChangeAspect="1"/>
+          </p:cNvPicPr>
+          <p:nvPr>
+            <p:ph idx="1"/>
+          </p:nvPr>
+        </p:nvPicPr>
+        <p:blipFill>
+          <a:blip r:embed="rId2"/>
+          <a:stretch>
+            <a:fillRect/>
+          </a:stretch>
+        </p:blipFill>
+        <p:spPr>
+          <a:xfrm>
+            <a:off x="1413809" y="3153450"/>
+            <a:ext cx="9364382" cy="1695687"/>
+          </a:xfrm>
+          <a:prstGeom prst="rect">
+            <a:avLst/>
+          </a:prstGeom>
+        </p:spPr>
+      </p:pic>
+    </p:spTree>
+    <p:extLst>
+      <p:ext uri="{BB962C8B-B14F-4D97-AF65-F5344CB8AC3E}">
+        <p14:creationId xmlns:p14="http://schemas.microsoft.com/office/powerpoint/2010/main" val="3768131965"/>
+      </p:ext>
+    </p:extLst>
+  </p:cSld>
+  <p:clrMapOvr>
+    <a:masterClrMapping/>
+  </p:clrMapOvr>
+</p:sld>
+</file>
+
+<file path=ppt/slides/slide22.xml><?xml version="1.0" encoding="utf-8"?>
+<p:sld xmlns:a="http://schemas.openxmlformats.org/drawingml/2006/main" xmlns:r="http://schemas.openxmlformats.org/officeDocument/2006/relationships" xmlns:p="http://schemas.openxmlformats.org/presentationml/2006/main">
+  <p:cSld>
+    <p:spTree>
+      <p:nvGrpSpPr>
+        <p:cNvPr id="1" name=""/>
+        <p:cNvGrpSpPr/>
+        <p:nvPr/>
+      </p:nvGrpSpPr>
+      <p:grpSpPr>
+        <a:xfrm>
+          <a:off x="0" y="0"/>
+          <a:ext cx="0" cy="0"/>
+          <a:chOff x="0" y="0"/>
+          <a:chExt cx="0" cy="0"/>
+        </a:xfrm>
+      </p:grpSpPr>
+      <p:sp>
+        <p:nvSpPr>
+          <p:cNvPr id="2" name="Title 1">
+            <a:extLst>
+              <a:ext uri="{FF2B5EF4-FFF2-40B4-BE49-F238E27FC236}">
+                <a16:creationId xmlns:a16="http://schemas.microsoft.com/office/drawing/2014/main" id="{BE7FAA2B-CC02-4FFF-A3FB-66EB23297EBE}"/>
+              </a:ext>
+            </a:extLst>
+          </p:cNvPr>
+          <p:cNvSpPr>
+            <a:spLocks noGrp="1"/>
+          </p:cNvSpPr>
+          <p:nvPr>
+            <p:ph type="title"/>
+          </p:nvPr>
+        </p:nvSpPr>
+        <p:spPr/>
+        <p:txBody>
+          <a:bodyPr/>
+          <a:lstStyle/>
+          <a:p>
+            <a:r>
+              <a:rPr lang="en-US">
+                <a:latin typeface="Times New Roman" panose="02020603050405020304" pitchFamily="18" charset="0"/>
+                <a:cs typeface="Times New Roman" panose="02020603050405020304" pitchFamily="18" charset="0"/>
+              </a:rPr>
+              <a:t>III. Áp dụng các mô hình máy học:</a:t>
+            </a:r>
+          </a:p>
+        </p:txBody>
+      </p:sp>
+      <p:pic>
+        <p:nvPicPr>
+          <p:cNvPr id="4" name="Content Placeholder 3">
+            <a:extLst>
+              <a:ext uri="{FF2B5EF4-FFF2-40B4-BE49-F238E27FC236}">
+                <a16:creationId xmlns:a16="http://schemas.microsoft.com/office/drawing/2014/main" id="{0C9576F1-D2C3-49E8-B81A-F10DACA307EA}"/>
+              </a:ext>
+            </a:extLst>
+          </p:cNvPr>
+          <p:cNvPicPr>
+            <a:picLocks noGrp="1" noChangeAspect="1"/>
+          </p:cNvPicPr>
+          <p:nvPr>
+            <p:ph idx="1"/>
+          </p:nvPr>
+        </p:nvPicPr>
+        <p:blipFill>
+          <a:blip r:embed="rId2"/>
+          <a:stretch>
+            <a:fillRect/>
+          </a:stretch>
+        </p:blipFill>
+        <p:spPr>
+          <a:xfrm>
+            <a:off x="1672739" y="1825625"/>
+            <a:ext cx="8846521" cy="4351338"/>
+          </a:xfrm>
+          <a:prstGeom prst="rect">
+            <a:avLst/>
+          </a:prstGeom>
+        </p:spPr>
+      </p:pic>
+    </p:spTree>
+    <p:extLst>
+      <p:ext uri="{BB962C8B-B14F-4D97-AF65-F5344CB8AC3E}">
+        <p14:creationId xmlns:p14="http://schemas.microsoft.com/office/powerpoint/2010/main" val="3839169904"/>
+      </p:ext>
+    </p:extLst>
+  </p:cSld>
+  <p:clrMapOvr>
+    <a:masterClrMapping/>
+  </p:clrMapOvr>
+</p:sld>
+</file>
+
+<file path=ppt/slides/slide23.xml><?xml version="1.0" encoding="utf-8"?>
+<p:sld xmlns:a="http://schemas.openxmlformats.org/drawingml/2006/main" xmlns:r="http://schemas.openxmlformats.org/officeDocument/2006/relationships" xmlns:p="http://schemas.openxmlformats.org/presentationml/2006/main">
+  <p:cSld>
+    <p:spTree>
+      <p:nvGrpSpPr>
+        <p:cNvPr id="1" name=""/>
+        <p:cNvGrpSpPr/>
+        <p:nvPr/>
+      </p:nvGrpSpPr>
+      <p:grpSpPr>
+        <a:xfrm>
+          <a:off x="0" y="0"/>
+          <a:ext cx="0" cy="0"/>
+          <a:chOff x="0" y="0"/>
+          <a:chExt cx="0" cy="0"/>
+        </a:xfrm>
+      </p:grpSpPr>
+      <p:sp>
+        <p:nvSpPr>
+          <p:cNvPr id="2" name="Title 1">
+            <a:extLst>
+              <a:ext uri="{FF2B5EF4-FFF2-40B4-BE49-F238E27FC236}">
+                <a16:creationId xmlns:a16="http://schemas.microsoft.com/office/drawing/2014/main" id="{E5C0E7B6-553D-4425-B235-C3886DF66A85}"/>
+              </a:ext>
+            </a:extLst>
+          </p:cNvPr>
+          <p:cNvSpPr>
+            <a:spLocks noGrp="1"/>
+          </p:cNvSpPr>
+          <p:nvPr>
+            <p:ph type="title"/>
+          </p:nvPr>
+        </p:nvSpPr>
+        <p:spPr>
+          <a:xfrm>
+            <a:off x="838200" y="365126"/>
+            <a:ext cx="10515600" cy="315912"/>
+          </a:xfrm>
+        </p:spPr>
+        <p:txBody>
+          <a:bodyPr>
+            <a:normAutofit fontScale="90000"/>
+          </a:bodyPr>
+          <a:lstStyle/>
+          <a:p>
+            <a:r>
+              <a:rPr lang="en-US" sz="3000"/>
+              <a:t>Nhận xét:</a:t>
+            </a:r>
+          </a:p>
+        </p:txBody>
+      </p:sp>
+      <p:sp>
+        <p:nvSpPr>
+          <p:cNvPr id="3" name="Content Placeholder 2">
+            <a:extLst>
+              <a:ext uri="{FF2B5EF4-FFF2-40B4-BE49-F238E27FC236}">
+                <a16:creationId xmlns:a16="http://schemas.microsoft.com/office/drawing/2014/main" id="{2694C363-DFF9-40E9-BF36-C6485AF418DF}"/>
+              </a:ext>
+            </a:extLst>
+          </p:cNvPr>
+          <p:cNvSpPr>
+            <a:spLocks noGrp="1"/>
+          </p:cNvSpPr>
+          <p:nvPr>
+            <p:ph idx="1"/>
+          </p:nvPr>
+        </p:nvSpPr>
+        <p:spPr>
+          <a:xfrm>
+            <a:off x="838200" y="833718"/>
+            <a:ext cx="10515600" cy="5659156"/>
+          </a:xfrm>
+        </p:spPr>
+        <p:txBody>
+          <a:bodyPr>
+            <a:noAutofit/>
+          </a:bodyPr>
+          <a:lstStyle/>
+          <a:p>
+            <a:pPr marL="0" indent="0">
+              <a:buNone/>
+            </a:pPr>
+            <a:r>
+              <a:rPr lang="vi-VN" sz="2400">
+                <a:latin typeface="+mj-lt"/>
+              </a:rPr>
+              <a:t>1. Accuracy</a:t>
+            </a:r>
+            <a:endParaRPr lang="en-US" sz="2400">
+              <a:latin typeface="+mj-lt"/>
+            </a:endParaRPr>
+          </a:p>
+          <a:p>
+            <a:r>
+              <a:rPr lang="vi-VN" sz="2400">
+                <a:latin typeface="+mj-lt"/>
+              </a:rPr>
+              <a:t>Tất cả mô hình (</a:t>
+            </a:r>
+            <a:r>
+              <a:rPr lang="vi-VN" sz="2400" b="1">
+                <a:latin typeface="+mj-lt"/>
+              </a:rPr>
+              <a:t>SVM, KNN, Logistic Regression, Decision Tree, Random Forest</a:t>
+            </a:r>
+            <a:r>
+              <a:rPr lang="vi-VN" sz="2400">
+                <a:latin typeface="+mj-lt"/>
+              </a:rPr>
+              <a:t>) đều đạt độ chính xác (</a:t>
+            </a:r>
+            <a:r>
+              <a:rPr lang="vi-VN" sz="2400" b="1">
+                <a:latin typeface="+mj-lt"/>
+              </a:rPr>
+              <a:t>Accuracy</a:t>
+            </a:r>
+            <a:r>
+              <a:rPr lang="vi-VN" sz="2400">
+                <a:latin typeface="+mj-lt"/>
+              </a:rPr>
+              <a:t>) gần </a:t>
+            </a:r>
+            <a:r>
+              <a:rPr lang="vi-VN" sz="2400" b="1">
+                <a:latin typeface="+mj-lt"/>
+              </a:rPr>
+              <a:t>1.0</a:t>
+            </a:r>
+            <a:r>
+              <a:rPr lang="vi-VN" sz="2400">
+                <a:latin typeface="+mj-lt"/>
+              </a:rPr>
+              <a:t>. </a:t>
+            </a:r>
+            <a:endParaRPr lang="en-US" sz="2400">
+              <a:latin typeface="+mj-lt"/>
+            </a:endParaRPr>
+          </a:p>
+          <a:p>
+            <a:r>
+              <a:rPr lang="vi-VN" sz="2400">
+                <a:latin typeface="+mj-lt"/>
+              </a:rPr>
+              <a:t> Điều này cho thấy các mô hình đều học tốt trên tập dữ liệu, khả năng phân loại chính xác cao.  </a:t>
+            </a:r>
+            <a:endParaRPr lang="en-US" sz="2400">
+              <a:latin typeface="+mj-lt"/>
+            </a:endParaRPr>
+          </a:p>
+          <a:p>
+            <a:r>
+              <a:rPr lang="vi-VN" sz="2400">
+                <a:latin typeface="+mj-lt"/>
+              </a:rPr>
+              <a:t>Tuy nhiên, vì độ chính xác quá cao, cần kiểm tra xem dữ liệu có </a:t>
+            </a:r>
+            <a:r>
+              <a:rPr lang="vi-VN" sz="2400" b="1">
+                <a:latin typeface="+mj-lt"/>
+              </a:rPr>
+              <a:t>mất cân bằng lớp (class imbalance)</a:t>
+            </a:r>
+            <a:r>
+              <a:rPr lang="vi-VN" sz="2400">
+                <a:latin typeface="+mj-lt"/>
+              </a:rPr>
+              <a:t> không, tránh tình trạng đánh giá </a:t>
+            </a:r>
+            <a:r>
+              <a:rPr lang="vi-VN" sz="2400" b="1">
+                <a:latin typeface="+mj-lt"/>
+              </a:rPr>
+              <a:t>bị ảo bởi Accuracy</a:t>
+            </a:r>
+            <a:r>
+              <a:rPr lang="vi-VN" sz="2400">
+                <a:latin typeface="+mj-lt"/>
+              </a:rPr>
+              <a:t>.</a:t>
+            </a:r>
+            <a:endParaRPr lang="en-US" sz="2400">
+              <a:latin typeface="+mj-lt"/>
+            </a:endParaRPr>
+          </a:p>
+          <a:p>
+            <a:pPr marL="0" indent="0">
+              <a:buNone/>
+            </a:pPr>
+            <a:r>
+              <a:rPr lang="vi-VN" sz="2400">
+                <a:latin typeface="+mj-lt"/>
+              </a:rPr>
+              <a:t>2. F1-macro</a:t>
+            </a:r>
+            <a:endParaRPr lang="en-US" sz="2400">
+              <a:latin typeface="+mj-lt"/>
+            </a:endParaRPr>
+          </a:p>
+          <a:p>
+            <a:r>
+              <a:rPr lang="vi-VN" sz="2400" b="1">
+                <a:latin typeface="+mj-lt"/>
+              </a:rPr>
+              <a:t>Logistic Regression, Decision Tree, Random Forest có F1-macro gần 1.0</a:t>
+            </a:r>
+            <a:r>
+              <a:rPr lang="en-US" sz="2400">
+                <a:latin typeface="+mj-lt"/>
+              </a:rPr>
+              <a:t>,</a:t>
+            </a:r>
+            <a:r>
+              <a:rPr lang="vi-VN" sz="2400">
+                <a:latin typeface="+mj-lt"/>
+              </a:rPr>
+              <a:t> nghĩa là mô hình cân bằng tốt giữa Precision và Recall.  </a:t>
+            </a:r>
+            <a:endParaRPr lang="en-US" sz="2400">
+              <a:latin typeface="+mj-lt"/>
+            </a:endParaRPr>
+          </a:p>
+          <a:p>
+            <a:r>
+              <a:rPr lang="vi-VN" sz="2400" b="1">
+                <a:latin typeface="+mj-lt"/>
+              </a:rPr>
+              <a:t>KNN</a:t>
+            </a:r>
+            <a:r>
+              <a:rPr lang="vi-VN" sz="2400">
+                <a:latin typeface="+mj-lt"/>
+              </a:rPr>
+              <a:t> cũng </a:t>
+            </a:r>
+            <a:r>
+              <a:rPr lang="vi-VN" sz="2400" b="1">
+                <a:latin typeface="+mj-lt"/>
+              </a:rPr>
+              <a:t>có F1 cao</a:t>
+            </a:r>
+            <a:r>
+              <a:rPr lang="vi-VN" sz="2400">
+                <a:latin typeface="+mj-lt"/>
+              </a:rPr>
+              <a:t>, nhưng </a:t>
+            </a:r>
+            <a:r>
+              <a:rPr lang="vi-VN" sz="2400" b="1">
+                <a:latin typeface="+mj-lt"/>
+              </a:rPr>
+              <a:t>có sai số chuẩn (std) lớn hơn một chút</a:t>
+            </a:r>
+            <a:r>
+              <a:rPr lang="vi-VN" sz="2400">
+                <a:latin typeface="+mj-lt"/>
+              </a:rPr>
+              <a:t>, chứng tỏ kết quả dao động hơn khi cross-validation. </a:t>
+            </a:r>
+            <a:endParaRPr lang="en-US" sz="2400">
+              <a:latin typeface="+mj-lt"/>
+            </a:endParaRPr>
+          </a:p>
+          <a:p>
+            <a:r>
+              <a:rPr lang="vi-VN" sz="2400" b="1">
+                <a:latin typeface="+mj-lt"/>
+              </a:rPr>
+              <a:t>SVM</a:t>
+            </a:r>
+            <a:r>
+              <a:rPr lang="vi-VN" sz="2400">
+                <a:latin typeface="+mj-lt"/>
+              </a:rPr>
+              <a:t> đạt </a:t>
+            </a:r>
+            <a:r>
+              <a:rPr lang="vi-VN" sz="2400" b="1">
+                <a:latin typeface="+mj-lt"/>
+              </a:rPr>
+              <a:t>Accuracy rất cao </a:t>
+            </a:r>
+            <a:r>
+              <a:rPr lang="vi-VN" sz="2400">
+                <a:latin typeface="+mj-lt"/>
+              </a:rPr>
+              <a:t>nhưng </a:t>
+            </a:r>
+            <a:r>
+              <a:rPr lang="vi-VN" sz="2400" b="1">
+                <a:latin typeface="+mj-lt"/>
+              </a:rPr>
+              <a:t>F1-macro thấp hơn (~0.85)</a:t>
+            </a:r>
+            <a:r>
+              <a:rPr lang="vi-VN" sz="2400">
+                <a:latin typeface="+mj-lt"/>
+              </a:rPr>
+              <a:t> → cho thấy mô hình </a:t>
+            </a:r>
+            <a:r>
+              <a:rPr lang="vi-VN" sz="2400" b="1">
+                <a:latin typeface="+mj-lt"/>
+              </a:rPr>
+              <a:t>có thể chưa cân bằng tốt </a:t>
+            </a:r>
+            <a:r>
+              <a:rPr lang="vi-VN" sz="2400">
+                <a:latin typeface="+mj-lt"/>
+              </a:rPr>
+              <a:t>giữa các lớp, có thể thiên lệch về lớp chính. </a:t>
+            </a:r>
+            <a:endParaRPr lang="en-US" sz="2400">
+              <a:latin typeface="+mj-lt"/>
+            </a:endParaRPr>
+          </a:p>
+        </p:txBody>
+      </p:sp>
+    </p:spTree>
+    <p:extLst>
+      <p:ext uri="{BB962C8B-B14F-4D97-AF65-F5344CB8AC3E}">
+        <p14:creationId xmlns:p14="http://schemas.microsoft.com/office/powerpoint/2010/main" val="3589724333"/>
+      </p:ext>
+    </p:extLst>
+  </p:cSld>
+  <p:clrMapOvr>
+    <a:masterClrMapping/>
+  </p:clrMapOvr>
+</p:sld>
+</file>
+
+<file path=ppt/slides/slide24.xml><?xml version="1.0" encoding="utf-8"?>
+<p:sld xmlns:a="http://schemas.openxmlformats.org/drawingml/2006/main" xmlns:r="http://schemas.openxmlformats.org/officeDocument/2006/relationships" xmlns:p="http://schemas.openxmlformats.org/presentationml/2006/main">
+  <p:cSld>
+    <p:spTree>
+      <p:nvGrpSpPr>
+        <p:cNvPr id="1" name=""/>
+        <p:cNvGrpSpPr/>
+        <p:nvPr/>
+      </p:nvGrpSpPr>
+      <p:grpSpPr>
+        <a:xfrm>
+          <a:off x="0" y="0"/>
+          <a:ext cx="0" cy="0"/>
+          <a:chOff x="0" y="0"/>
+          <a:chExt cx="0" cy="0"/>
+        </a:xfrm>
+      </p:grpSpPr>
+      <p:sp>
+        <p:nvSpPr>
+          <p:cNvPr id="2" name="Title 1">
+            <a:extLst>
+              <a:ext uri="{FF2B5EF4-FFF2-40B4-BE49-F238E27FC236}">
+                <a16:creationId xmlns:a16="http://schemas.microsoft.com/office/drawing/2014/main" id="{60319D1A-EE6E-47F1-A83C-59F1EC3B2133}"/>
+              </a:ext>
+            </a:extLst>
+          </p:cNvPr>
+          <p:cNvSpPr>
+            <a:spLocks noGrp="1"/>
+          </p:cNvSpPr>
+          <p:nvPr>
+            <p:ph type="title"/>
+          </p:nvPr>
+        </p:nvSpPr>
+        <p:spPr/>
+        <p:txBody>
+          <a:bodyPr/>
+          <a:lstStyle/>
+          <a:p>
+            <a:r>
+              <a:rPr lang="en-US">
+                <a:latin typeface="Times New Roman" panose="02020603050405020304" pitchFamily="18" charset="0"/>
+                <a:cs typeface="Times New Roman" panose="02020603050405020304" pitchFamily="18" charset="0"/>
+              </a:rPr>
+              <a:t>Kết luận:</a:t>
+            </a:r>
+          </a:p>
+        </p:txBody>
+      </p:sp>
+      <p:sp>
+        <p:nvSpPr>
+          <p:cNvPr id="3" name="Content Placeholder 2">
+            <a:extLst>
+              <a:ext uri="{FF2B5EF4-FFF2-40B4-BE49-F238E27FC236}">
+                <a16:creationId xmlns:a16="http://schemas.microsoft.com/office/drawing/2014/main" id="{FC75B739-6FFE-4839-A881-DFF0C370F371}"/>
+              </a:ext>
+            </a:extLst>
+          </p:cNvPr>
+          <p:cNvSpPr>
+            <a:spLocks noGrp="1"/>
+          </p:cNvSpPr>
+          <p:nvPr>
+            <p:ph idx="1"/>
+          </p:nvPr>
+        </p:nvSpPr>
+        <p:spPr/>
+        <p:txBody>
+          <a:bodyPr/>
+          <a:lstStyle/>
+          <a:p>
+            <a:r>
+              <a:rPr lang="vi-VN">
+                <a:latin typeface="+mj-lt"/>
+              </a:rPr>
+              <a:t>Nếu chỉ xét </a:t>
+            </a:r>
+            <a:r>
+              <a:rPr lang="en-US">
+                <a:latin typeface="+mj-lt"/>
+              </a:rPr>
+              <a:t> </a:t>
+            </a:r>
+            <a:r>
+              <a:rPr lang="vi-VN" b="1">
+                <a:latin typeface="+mj-lt"/>
+              </a:rPr>
+              <a:t>Accuracy</a:t>
+            </a:r>
+            <a:r>
+              <a:rPr lang="vi-VN">
+                <a:latin typeface="+mj-lt"/>
+              </a:rPr>
+              <a:t>, tất cả mô hình đều </a:t>
+            </a:r>
+            <a:r>
+              <a:rPr lang="vi-VN" b="1">
+                <a:latin typeface="+mj-lt"/>
+              </a:rPr>
+              <a:t>"tốt".  </a:t>
+            </a:r>
+            <a:endParaRPr lang="en-US" b="1">
+              <a:latin typeface="+mj-lt"/>
+            </a:endParaRPr>
+          </a:p>
+          <a:p>
+            <a:r>
+              <a:rPr lang="vi-VN">
+                <a:latin typeface="+mj-lt"/>
+              </a:rPr>
+              <a:t>Nếu xét thêm </a:t>
+            </a:r>
+            <a:r>
+              <a:rPr lang="vi-VN" b="1">
+                <a:latin typeface="+mj-lt"/>
+              </a:rPr>
+              <a:t>F1-macro</a:t>
+            </a:r>
+            <a:r>
+              <a:rPr lang="vi-VN">
+                <a:latin typeface="+mj-lt"/>
+              </a:rPr>
+              <a:t> (phù hợp cho dữ liệu mất cân bằng), thì </a:t>
+            </a:r>
+            <a:r>
+              <a:rPr lang="vi-VN" b="1">
+                <a:latin typeface="+mj-lt"/>
+              </a:rPr>
+              <a:t>Logistic Regression, Decision Tree, Random Forest</a:t>
+            </a:r>
+            <a:r>
+              <a:rPr lang="vi-VN">
+                <a:latin typeface="+mj-lt"/>
+              </a:rPr>
+              <a:t> có hiệu quả ổn định và vượt trội hơn.  </a:t>
+            </a:r>
+            <a:endParaRPr lang="en-US">
+              <a:latin typeface="+mj-lt"/>
+            </a:endParaRPr>
+          </a:p>
+          <a:p>
+            <a:r>
+              <a:rPr lang="vi-VN" b="1">
+                <a:latin typeface="+mj-lt"/>
+              </a:rPr>
+              <a:t>SVM</a:t>
+            </a:r>
+            <a:r>
+              <a:rPr lang="vi-VN">
+                <a:latin typeface="+mj-lt"/>
+              </a:rPr>
+              <a:t> cần cân nhắc vì tuy chính xác cao nhưng chưa cân bằng các lớp. </a:t>
+            </a:r>
+            <a:endParaRPr lang="en-US">
+              <a:latin typeface="+mj-lt"/>
+            </a:endParaRPr>
+          </a:p>
+          <a:p>
+            <a:r>
+              <a:rPr lang="vi-VN">
+                <a:latin typeface="+mj-lt"/>
+              </a:rPr>
+              <a:t> </a:t>
+            </a:r>
+            <a:r>
+              <a:rPr lang="vi-VN" b="1">
+                <a:latin typeface="+mj-lt"/>
+              </a:rPr>
+              <a:t>KNN</a:t>
+            </a:r>
+            <a:r>
+              <a:rPr lang="en-US" b="1">
+                <a:latin typeface="+mj-lt"/>
+              </a:rPr>
+              <a:t> </a:t>
+            </a:r>
+            <a:r>
+              <a:rPr lang="vi-VN">
+                <a:latin typeface="+mj-lt"/>
+              </a:rPr>
+              <a:t>hoạt động tốt nhưng nhạy cảm với dữ liệu, dẫn đến dao động kết quả.</a:t>
+            </a:r>
+            <a:endParaRPr lang="en-US">
+              <a:latin typeface="+mj-lt"/>
+            </a:endParaRPr>
+          </a:p>
+        </p:txBody>
+      </p:sp>
+    </p:spTree>
+    <p:extLst>
+      <p:ext uri="{BB962C8B-B14F-4D97-AF65-F5344CB8AC3E}">
+        <p14:creationId xmlns:p14="http://schemas.microsoft.com/office/powerpoint/2010/main" val="518214545"/>
+      </p:ext>
+    </p:extLst>
+  </p:cSld>
+  <p:clrMapOvr>
+    <a:masterClrMapping/>
+  </p:clrMapOvr>
+</p:sld>
+</file>
+
+<file path=ppt/slides/slide25.xml><?xml version="1.0" encoding="utf-8"?>
+<p:sld xmlns:a="http://schemas.openxmlformats.org/drawingml/2006/main" xmlns:r="http://schemas.openxmlformats.org/officeDocument/2006/relationships" xmlns:p="http://schemas.openxmlformats.org/presentationml/2006/main">
+  <p:cSld>
+    <p:spTree>
+      <p:nvGrpSpPr>
+        <p:cNvPr id="1" name=""/>
+        <p:cNvGrpSpPr/>
+        <p:nvPr/>
+      </p:nvGrpSpPr>
+      <p:grpSpPr>
+        <a:xfrm>
+          <a:off x="0" y="0"/>
+          <a:ext cx="0" cy="0"/>
+          <a:chOff x="0" y="0"/>
+          <a:chExt cx="0" cy="0"/>
+        </a:xfrm>
+      </p:grpSpPr>
+      <p:sp>
+        <p:nvSpPr>
+          <p:cNvPr id="2" name="Title 1">
+            <a:extLst>
+              <a:ext uri="{FF2B5EF4-FFF2-40B4-BE49-F238E27FC236}">
+                <a16:creationId xmlns:a16="http://schemas.microsoft.com/office/drawing/2014/main" id="{34D9CE8D-C38B-477D-AC6C-B394B8B4E449}"/>
+              </a:ext>
+            </a:extLst>
+          </p:cNvPr>
+          <p:cNvSpPr>
+            <a:spLocks noGrp="1"/>
+          </p:cNvSpPr>
+          <p:nvPr>
+            <p:ph type="title"/>
+          </p:nvPr>
+        </p:nvSpPr>
+        <p:spPr>
+          <a:xfrm>
+            <a:off x="838200" y="2588372"/>
+            <a:ext cx="10515600" cy="1325563"/>
+          </a:xfrm>
+        </p:spPr>
+        <p:txBody>
+          <a:bodyPr>
+            <a:normAutofit/>
+          </a:bodyPr>
+          <a:lstStyle/>
+          <a:p>
+            <a:pPr algn="ctr"/>
+            <a:r>
+              <a:rPr lang="en-US" sz="5000">
+                <a:latin typeface="Times New Roman" panose="02020603050405020304" pitchFamily="18" charset="0"/>
+                <a:cs typeface="Times New Roman" panose="02020603050405020304" pitchFamily="18" charset="0"/>
+              </a:rPr>
+              <a:t>Kết thúc</a:t>
+            </a:r>
+          </a:p>
+        </p:txBody>
+      </p:sp>
+    </p:spTree>
+    <p:extLst>
+      <p:ext uri="{BB962C8B-B14F-4D97-AF65-F5344CB8AC3E}">
+        <p14:creationId xmlns:p14="http://schemas.microsoft.com/office/powerpoint/2010/main" val="158491007"/>
+      </p:ext>
+    </p:extLst>
+  </p:cSld>
+  <p:clrMapOvr>
+    <a:masterClrMapping/>
+  </p:clrMapOvr>
+</p:sld>
+</file>
+
+<file path=ppt/slides/slide3.xml><?xml version="1.0" encoding="utf-8"?>
+<p:sld xmlns:a="http://schemas.openxmlformats.org/drawingml/2006/main" xmlns:r="http://schemas.openxmlformats.org/officeDocument/2006/relationships" xmlns:p="http://schemas.openxmlformats.org/presentationml/2006/main">
+  <p:cSld>
+    <p:spTree>
+      <p:nvGrpSpPr>
+        <p:cNvPr id="1" name=""/>
+        <p:cNvGrpSpPr/>
+        <p:nvPr/>
+      </p:nvGrpSpPr>
+      <p:grpSpPr>
+        <a:xfrm>
+          <a:off x="0" y="0"/>
+          <a:ext cx="0" cy="0"/>
+          <a:chOff x="0" y="0"/>
+          <a:chExt cx="0" cy="0"/>
+        </a:xfrm>
+      </p:grpSpPr>
+      <p:sp>
+        <p:nvSpPr>
+          <p:cNvPr id="3" name="Content Placeholder 2">
+            <a:extLst>
+              <a:ext uri="{FF2B5EF4-FFF2-40B4-BE49-F238E27FC236}">
+                <a16:creationId xmlns:a16="http://schemas.microsoft.com/office/drawing/2014/main" id="{58B1CAE0-D3B5-4C07-8A40-0A658D0A2A5B}"/>
+              </a:ext>
+            </a:extLst>
+          </p:cNvPr>
+          <p:cNvSpPr>
+            <a:spLocks noGrp="1"/>
+          </p:cNvSpPr>
+          <p:nvPr>
+            <p:ph idx="1"/>
+          </p:nvPr>
+        </p:nvSpPr>
+        <p:spPr>
+          <a:xfrm>
+            <a:off x="838199" y="564776"/>
+            <a:ext cx="11066929" cy="5612187"/>
+          </a:xfrm>
+        </p:spPr>
+        <p:txBody>
+          <a:bodyPr/>
+          <a:lstStyle/>
+          <a:p>
+            <a:pPr marL="0" indent="0">
+              <a:buNone/>
+            </a:pPr>
+            <a:r>
+              <a:rPr lang="en-US" sz="3000">
+                <a:latin typeface="Times New Roman" panose="02020603050405020304" pitchFamily="18" charset="0"/>
+                <a:cs typeface="Times New Roman" panose="02020603050405020304" pitchFamily="18" charset="0"/>
+              </a:rPr>
+              <a:t>2. Các cột dữ liệu:</a:t>
+            </a:r>
+          </a:p>
+          <a:p>
+            <a:r>
+              <a:rPr lang="vi-VN" b="1">
+                <a:latin typeface="Times New Roman" panose="02020603050405020304" pitchFamily="18" charset="0"/>
+                <a:cs typeface="Times New Roman" panose="02020603050405020304" pitchFamily="18" charset="0"/>
+              </a:rPr>
+              <a:t>InvoiceNo</a:t>
+            </a:r>
+            <a:r>
+              <a:rPr lang="vi-VN">
+                <a:latin typeface="Times New Roman" panose="02020603050405020304" pitchFamily="18" charset="0"/>
+                <a:cs typeface="Times New Roman" panose="02020603050405020304" pitchFamily="18" charset="0"/>
+              </a:rPr>
+              <a:t>: Mã hóa đơn (có thể có hóa đơn hủy nếu bắt đầu bằng `C`).</a:t>
+            </a:r>
+            <a:endParaRPr lang="en-US">
+              <a:latin typeface="Times New Roman" panose="02020603050405020304" pitchFamily="18" charset="0"/>
+              <a:cs typeface="Times New Roman" panose="02020603050405020304" pitchFamily="18" charset="0"/>
+            </a:endParaRPr>
+          </a:p>
+          <a:p>
+            <a:r>
+              <a:rPr lang="vi-VN" b="1">
+                <a:latin typeface="Times New Roman" panose="02020603050405020304" pitchFamily="18" charset="0"/>
+                <a:cs typeface="Times New Roman" panose="02020603050405020304" pitchFamily="18" charset="0"/>
+              </a:rPr>
+              <a:t>StockCode</a:t>
+            </a:r>
+            <a:r>
+              <a:rPr lang="vi-VN">
+                <a:latin typeface="Times New Roman" panose="02020603050405020304" pitchFamily="18" charset="0"/>
+                <a:cs typeface="Times New Roman" panose="02020603050405020304" pitchFamily="18" charset="0"/>
+              </a:rPr>
+              <a:t>: Mã sản phẩm.</a:t>
+            </a:r>
+            <a:endParaRPr lang="en-US">
+              <a:latin typeface="Times New Roman" panose="02020603050405020304" pitchFamily="18" charset="0"/>
+              <a:cs typeface="Times New Roman" panose="02020603050405020304" pitchFamily="18" charset="0"/>
+            </a:endParaRPr>
+          </a:p>
+          <a:p>
+            <a:r>
+              <a:rPr lang="vi-VN" b="1">
+                <a:latin typeface="Times New Roman" panose="02020603050405020304" pitchFamily="18" charset="0"/>
+                <a:cs typeface="Times New Roman" panose="02020603050405020304" pitchFamily="18" charset="0"/>
+              </a:rPr>
+              <a:t>Descriptio</a:t>
+            </a:r>
+            <a:r>
+              <a:rPr lang="en-US">
+                <a:latin typeface="Times New Roman" panose="02020603050405020304" pitchFamily="18" charset="0"/>
+                <a:cs typeface="Times New Roman" panose="02020603050405020304" pitchFamily="18" charset="0"/>
+              </a:rPr>
+              <a:t>n</a:t>
+            </a:r>
+            <a:r>
+              <a:rPr lang="vi-VN">
+                <a:latin typeface="Times New Roman" panose="02020603050405020304" pitchFamily="18" charset="0"/>
+                <a:cs typeface="Times New Roman" panose="02020603050405020304" pitchFamily="18" charset="0"/>
+              </a:rPr>
+              <a:t>: Mô tả sản phẩm.</a:t>
+            </a:r>
+            <a:endParaRPr lang="en-US">
+              <a:latin typeface="Times New Roman" panose="02020603050405020304" pitchFamily="18" charset="0"/>
+              <a:cs typeface="Times New Roman" panose="02020603050405020304" pitchFamily="18" charset="0"/>
+            </a:endParaRPr>
+          </a:p>
+          <a:p>
+            <a:r>
+              <a:rPr lang="vi-VN" b="1">
+                <a:latin typeface="Times New Roman" panose="02020603050405020304" pitchFamily="18" charset="0"/>
+                <a:cs typeface="Times New Roman" panose="02020603050405020304" pitchFamily="18" charset="0"/>
+              </a:rPr>
+              <a:t>Quantity</a:t>
+            </a:r>
+            <a:r>
+              <a:rPr lang="vi-VN">
+                <a:latin typeface="Times New Roman" panose="02020603050405020304" pitchFamily="18" charset="0"/>
+                <a:cs typeface="Times New Roman" panose="02020603050405020304" pitchFamily="18" charset="0"/>
+              </a:rPr>
+              <a:t>: Số lượng sản phẩm trong đơn (có thể âm khi trả hàng).</a:t>
+            </a:r>
+            <a:endParaRPr lang="en-US">
+              <a:latin typeface="Times New Roman" panose="02020603050405020304" pitchFamily="18" charset="0"/>
+              <a:cs typeface="Times New Roman" panose="02020603050405020304" pitchFamily="18" charset="0"/>
+            </a:endParaRPr>
+          </a:p>
+          <a:p>
+            <a:r>
+              <a:rPr lang="vi-VN" b="1">
+                <a:latin typeface="Times New Roman" panose="02020603050405020304" pitchFamily="18" charset="0"/>
+                <a:cs typeface="Times New Roman" panose="02020603050405020304" pitchFamily="18" charset="0"/>
+              </a:rPr>
+              <a:t>InvoiceDate</a:t>
+            </a:r>
+            <a:r>
+              <a:rPr lang="vi-VN">
+                <a:latin typeface="Times New Roman" panose="02020603050405020304" pitchFamily="18" charset="0"/>
+                <a:cs typeface="Times New Roman" panose="02020603050405020304" pitchFamily="18" charset="0"/>
+              </a:rPr>
+              <a:t>: Ngày giờ giao dịch.</a:t>
+            </a:r>
+            <a:endParaRPr lang="en-US">
+              <a:latin typeface="Times New Roman" panose="02020603050405020304" pitchFamily="18" charset="0"/>
+              <a:cs typeface="Times New Roman" panose="02020603050405020304" pitchFamily="18" charset="0"/>
+            </a:endParaRPr>
+          </a:p>
+          <a:p>
+            <a:r>
+              <a:rPr lang="vi-VN" b="1">
+                <a:latin typeface="Times New Roman" panose="02020603050405020304" pitchFamily="18" charset="0"/>
+                <a:cs typeface="Times New Roman" panose="02020603050405020304" pitchFamily="18" charset="0"/>
+              </a:rPr>
+              <a:t>UnitPrice</a:t>
+            </a:r>
+            <a:r>
+              <a:rPr lang="vi-VN">
+                <a:latin typeface="Times New Roman" panose="02020603050405020304" pitchFamily="18" charset="0"/>
+                <a:cs typeface="Times New Roman" panose="02020603050405020304" pitchFamily="18" charset="0"/>
+              </a:rPr>
+              <a:t>: Giá mỗi sản phẩm (bảng Anh).</a:t>
+            </a:r>
+            <a:endParaRPr lang="en-US">
+              <a:latin typeface="Times New Roman" panose="02020603050405020304" pitchFamily="18" charset="0"/>
+              <a:cs typeface="Times New Roman" panose="02020603050405020304" pitchFamily="18" charset="0"/>
+            </a:endParaRPr>
+          </a:p>
+          <a:p>
+            <a:r>
+              <a:rPr lang="vi-VN" b="1">
+                <a:latin typeface="Times New Roman" panose="02020603050405020304" pitchFamily="18" charset="0"/>
+                <a:cs typeface="Times New Roman" panose="02020603050405020304" pitchFamily="18" charset="0"/>
+              </a:rPr>
+              <a:t>CustomerID</a:t>
+            </a:r>
+            <a:r>
+              <a:rPr lang="vi-VN">
+                <a:latin typeface="Times New Roman" panose="02020603050405020304" pitchFamily="18" charset="0"/>
+                <a:cs typeface="Times New Roman" panose="02020603050405020304" pitchFamily="18" charset="0"/>
+              </a:rPr>
+              <a:t>: Mã khách hàng (có giá trị thiếu).</a:t>
+            </a:r>
+            <a:endParaRPr lang="en-US">
+              <a:latin typeface="Times New Roman" panose="02020603050405020304" pitchFamily="18" charset="0"/>
+              <a:cs typeface="Times New Roman" panose="02020603050405020304" pitchFamily="18" charset="0"/>
+            </a:endParaRPr>
+          </a:p>
+          <a:p>
+            <a:r>
+              <a:rPr lang="vi-VN" b="1">
+                <a:latin typeface="Times New Roman" panose="02020603050405020304" pitchFamily="18" charset="0"/>
+                <a:cs typeface="Times New Roman" panose="02020603050405020304" pitchFamily="18" charset="0"/>
+              </a:rPr>
+              <a:t>Country</a:t>
+            </a:r>
+            <a:r>
+              <a:rPr lang="vi-VN">
+                <a:latin typeface="Times New Roman" panose="02020603050405020304" pitchFamily="18" charset="0"/>
+                <a:cs typeface="Times New Roman" panose="02020603050405020304" pitchFamily="18" charset="0"/>
+              </a:rPr>
+              <a:t>: Quốc gia nơi khách hàng mua hàng. </a:t>
+            </a:r>
+            <a:endParaRPr lang="en-US">
+              <a:latin typeface="Times New Roman" panose="02020603050405020304" pitchFamily="18" charset="0"/>
+              <a:cs typeface="Times New Roman" panose="02020603050405020304" pitchFamily="18" charset="0"/>
+            </a:endParaRPr>
+          </a:p>
+        </p:txBody>
+      </p:sp>
+    </p:spTree>
+    <p:extLst>
+      <p:ext uri="{BB962C8B-B14F-4D97-AF65-F5344CB8AC3E}">
+        <p14:creationId xmlns:p14="http://schemas.microsoft.com/office/powerpoint/2010/main" val="905315151"/>
+      </p:ext>
+    </p:extLst>
+  </p:cSld>
+  <p:clrMapOvr>
+    <a:masterClrMapping/>
+  </p:clrMapOvr>
+</p:sld>
+</file>
+
+<file path=ppt/slides/slide4.xml><?xml version="1.0" encoding="utf-8"?>
+<p:sld xmlns:a="http://schemas.openxmlformats.org/drawingml/2006/main" xmlns:r="http://schemas.openxmlformats.org/officeDocument/2006/relationships" xmlns:p="http://schemas.openxmlformats.org/presentationml/2006/main">
+  <p:cSld>
+    <p:spTree>
+      <p:nvGrpSpPr>
+        <p:cNvPr id="1" name=""/>
+        <p:cNvGrpSpPr/>
+        <p:nvPr/>
+      </p:nvGrpSpPr>
+      <p:grpSpPr>
+        <a:xfrm>
+          <a:off x="0" y="0"/>
+          <a:ext cx="0" cy="0"/>
+          <a:chOff x="0" y="0"/>
+          <a:chExt cx="0" cy="0"/>
+        </a:xfrm>
+      </p:grpSpPr>
+      <p:sp>
+        <p:nvSpPr>
+          <p:cNvPr id="2" name="Title 1">
+            <a:extLst>
+              <a:ext uri="{FF2B5EF4-FFF2-40B4-BE49-F238E27FC236}">
+                <a16:creationId xmlns:a16="http://schemas.microsoft.com/office/drawing/2014/main" id="{DBA48DD9-96F2-4619-8BC1-2C53A5197B05}"/>
+              </a:ext>
+            </a:extLst>
+          </p:cNvPr>
+          <p:cNvSpPr>
+            <a:spLocks noGrp="1"/>
+          </p:cNvSpPr>
+          <p:nvPr>
+            <p:ph type="title"/>
+          </p:nvPr>
+        </p:nvSpPr>
+        <p:spPr/>
+        <p:txBody>
+          <a:bodyPr/>
+          <a:lstStyle/>
+          <a:p>
+            <a:r>
+              <a:rPr lang="en-US">
+                <a:latin typeface="Times New Roman" panose="02020603050405020304" pitchFamily="18" charset="0"/>
+                <a:cs typeface="Times New Roman" panose="02020603050405020304" pitchFamily="18" charset="0"/>
+              </a:rPr>
+              <a:t>II. Phân tích dữ liệu khám phá:</a:t>
+            </a:r>
+          </a:p>
+        </p:txBody>
+      </p:sp>
+      <p:sp>
+        <p:nvSpPr>
+          <p:cNvPr id="3" name="Content Placeholder 2">
+            <a:extLst>
+              <a:ext uri="{FF2B5EF4-FFF2-40B4-BE49-F238E27FC236}">
+                <a16:creationId xmlns:a16="http://schemas.microsoft.com/office/drawing/2014/main" id="{6856B18A-D6AB-4388-BE48-B9CE70B87001}"/>
+              </a:ext>
+            </a:extLst>
+          </p:cNvPr>
+          <p:cNvSpPr>
+            <a:spLocks noGrp="1"/>
+          </p:cNvSpPr>
+          <p:nvPr>
+            <p:ph idx="1"/>
+          </p:nvPr>
+        </p:nvSpPr>
+        <p:spPr>
+          <a:xfrm>
+            <a:off x="838200" y="1398494"/>
+            <a:ext cx="10515600" cy="4778469"/>
+          </a:xfrm>
+        </p:spPr>
+        <p:txBody>
+          <a:bodyPr/>
+          <a:lstStyle/>
+          <a:p>
+            <a:r>
+              <a:rPr lang="en-US"/>
+              <a:t>1. Tổng quan về dữ liệu:</a:t>
+            </a:r>
+          </a:p>
+          <a:p>
+            <a:endParaRPr lang="en-US"/>
+          </a:p>
+        </p:txBody>
+      </p:sp>
+      <p:pic>
+        <p:nvPicPr>
+          <p:cNvPr id="4" name="Picture 3">
+            <a:extLst>
+              <a:ext uri="{FF2B5EF4-FFF2-40B4-BE49-F238E27FC236}">
+                <a16:creationId xmlns:a16="http://schemas.microsoft.com/office/drawing/2014/main" id="{1C0BF136-FC94-4729-97B5-46B383193320}"/>
+              </a:ext>
+            </a:extLst>
+          </p:cNvPr>
+          <p:cNvPicPr>
+            <a:picLocks noChangeAspect="1"/>
+          </p:cNvPicPr>
+          <p:nvPr/>
+        </p:nvPicPr>
+        <p:blipFill>
+          <a:blip r:embed="rId2"/>
+          <a:stretch>
+            <a:fillRect/>
+          </a:stretch>
+        </p:blipFill>
+        <p:spPr>
+          <a:xfrm>
+            <a:off x="1111796" y="1999129"/>
+            <a:ext cx="9573961" cy="4054193"/>
+          </a:xfrm>
+          <a:prstGeom prst="rect">
+            <a:avLst/>
+          </a:prstGeom>
+        </p:spPr>
+      </p:pic>
+    </p:spTree>
+    <p:extLst>
+      <p:ext uri="{BB962C8B-B14F-4D97-AF65-F5344CB8AC3E}">
+        <p14:creationId xmlns:p14="http://schemas.microsoft.com/office/powerpoint/2010/main" val="1419275725"/>
+      </p:ext>
+    </p:extLst>
+  </p:cSld>
+  <p:clrMapOvr>
+    <a:masterClrMapping/>
+  </p:clrMapOvr>
+</p:sld>
+</file>
+
+<file path=ppt/slides/slide5.xml><?xml version="1.0" encoding="utf-8"?>
+<p:sld xmlns:a="http://schemas.openxmlformats.org/drawingml/2006/main" xmlns:r="http://schemas.openxmlformats.org/officeDocument/2006/relationships" xmlns:p="http://schemas.openxmlformats.org/presentationml/2006/main">
+  <p:cSld>
+    <p:spTree>
+      <p:nvGrpSpPr>
+        <p:cNvPr id="1" name=""/>
+        <p:cNvGrpSpPr/>
+        <p:nvPr/>
+      </p:nvGrpSpPr>
+      <p:grpSpPr>
+        <a:xfrm>
+          <a:off x="0" y="0"/>
+          <a:ext cx="0" cy="0"/>
+          <a:chOff x="0" y="0"/>
+          <a:chExt cx="0" cy="0"/>
+        </a:xfrm>
+      </p:grpSpPr>
+      <p:sp>
+        <p:nvSpPr>
+          <p:cNvPr id="3" name="Content Placeholder 2">
+            <a:extLst>
+              <a:ext uri="{FF2B5EF4-FFF2-40B4-BE49-F238E27FC236}">
+                <a16:creationId xmlns:a16="http://schemas.microsoft.com/office/drawing/2014/main" id="{8D8DCCF9-AD1E-4C1D-86BC-51E1748D9840}"/>
+              </a:ext>
+            </a:extLst>
+          </p:cNvPr>
+          <p:cNvSpPr>
+            <a:spLocks noGrp="1"/>
+          </p:cNvSpPr>
+          <p:nvPr>
+            <p:ph idx="1"/>
+          </p:nvPr>
+        </p:nvSpPr>
+        <p:spPr>
+          <a:xfrm>
+            <a:off x="551330" y="430306"/>
+            <a:ext cx="10515600" cy="5836304"/>
+          </a:xfrm>
+        </p:spPr>
+        <p:txBody>
+          <a:bodyPr/>
+          <a:lstStyle/>
+          <a:p>
+            <a:pPr marL="0" indent="0" algn="ctr">
+              <a:buNone/>
+            </a:pPr>
+            <a:r>
+              <a:rPr lang="en-US">
+                <a:latin typeface="Times New Roman" panose="02020603050405020304" pitchFamily="18" charset="0"/>
+                <a:cs typeface="Times New Roman" panose="02020603050405020304" pitchFamily="18" charset="0"/>
+              </a:rPr>
+              <a:t>5 dòng đầu:</a:t>
+            </a:r>
+          </a:p>
+          <a:p>
+            <a:pPr marL="0" indent="0">
+              <a:buNone/>
+            </a:pPr>
+            <a:endParaRPr lang="en-US"/>
+          </a:p>
+        </p:txBody>
+      </p:sp>
+      <p:pic>
+        <p:nvPicPr>
+          <p:cNvPr id="4" name="Picture 3">
+            <a:extLst>
+              <a:ext uri="{FF2B5EF4-FFF2-40B4-BE49-F238E27FC236}">
+                <a16:creationId xmlns:a16="http://schemas.microsoft.com/office/drawing/2014/main" id="{4905208D-7ABC-42D0-8607-ED83E2477CB4}"/>
+              </a:ext>
+            </a:extLst>
+          </p:cNvPr>
+          <p:cNvPicPr>
+            <a:picLocks noChangeAspect="1"/>
+          </p:cNvPicPr>
+          <p:nvPr/>
+        </p:nvPicPr>
+        <p:blipFill>
+          <a:blip r:embed="rId2"/>
+          <a:stretch>
+            <a:fillRect/>
+          </a:stretch>
+        </p:blipFill>
+        <p:spPr>
+          <a:xfrm>
+            <a:off x="838200" y="1209456"/>
+            <a:ext cx="10295965" cy="3676307"/>
+          </a:xfrm>
+          <a:prstGeom prst="rect">
+            <a:avLst/>
+          </a:prstGeom>
+        </p:spPr>
+      </p:pic>
+    </p:spTree>
+    <p:extLst>
+      <p:ext uri="{BB962C8B-B14F-4D97-AF65-F5344CB8AC3E}">
+        <p14:creationId xmlns:p14="http://schemas.microsoft.com/office/powerpoint/2010/main" val="824092724"/>
+      </p:ext>
+    </p:extLst>
+  </p:cSld>
+  <p:clrMapOvr>
+    <a:masterClrMapping/>
+  </p:clrMapOvr>
+</p:sld>
+</file>
+
+<file path=ppt/slides/slide6.xml><?xml version="1.0" encoding="utf-8"?>
+<p:sld xmlns:a="http://schemas.openxmlformats.org/drawingml/2006/main" xmlns:r="http://schemas.openxmlformats.org/officeDocument/2006/relationships" xmlns:p="http://schemas.openxmlformats.org/presentationml/2006/main">
+  <p:cSld>
+    <p:spTree>
+      <p:nvGrpSpPr>
+        <p:cNvPr id="1" name=""/>
+        <p:cNvGrpSpPr/>
+        <p:nvPr/>
+      </p:nvGrpSpPr>
+      <p:grpSpPr>
+        <a:xfrm>
+          <a:off x="0" y="0"/>
+          <a:ext cx="0" cy="0"/>
+          <a:chOff x="0" y="0"/>
+          <a:chExt cx="0" cy="0"/>
+        </a:xfrm>
+      </p:grpSpPr>
+      <p:sp>
+        <p:nvSpPr>
+          <p:cNvPr id="3" name="Content Placeholder 2">
+            <a:extLst>
+              <a:ext uri="{FF2B5EF4-FFF2-40B4-BE49-F238E27FC236}">
+                <a16:creationId xmlns:a16="http://schemas.microsoft.com/office/drawing/2014/main" id="{A5BD6DC0-F167-48BF-8F6B-717772DD9AD5}"/>
+              </a:ext>
+            </a:extLst>
+          </p:cNvPr>
+          <p:cNvSpPr>
+            <a:spLocks noGrp="1"/>
+          </p:cNvSpPr>
+          <p:nvPr>
+            <p:ph idx="1"/>
+          </p:nvPr>
+        </p:nvSpPr>
+        <p:spPr>
+          <a:xfrm>
+            <a:off x="345141" y="403411"/>
+            <a:ext cx="10515600" cy="5692869"/>
+          </a:xfrm>
+        </p:spPr>
+        <p:txBody>
+          <a:bodyPr/>
+          <a:lstStyle/>
+          <a:p>
+            <a:pPr marL="0" indent="0" algn="ctr">
+              <a:buNone/>
+            </a:pPr>
+            <a:r>
+              <a:rPr lang="en-US">
+                <a:latin typeface="Times New Roman" panose="02020603050405020304" pitchFamily="18" charset="0"/>
+                <a:cs typeface="Times New Roman" panose="02020603050405020304" pitchFamily="18" charset="0"/>
+              </a:rPr>
+              <a:t>5 dòng cuối:</a:t>
+            </a:r>
+          </a:p>
+          <a:p>
+            <a:endParaRPr lang="en-US"/>
+          </a:p>
+        </p:txBody>
+      </p:sp>
+      <p:pic>
+        <p:nvPicPr>
+          <p:cNvPr id="4" name="Picture 3">
+            <a:extLst>
+              <a:ext uri="{FF2B5EF4-FFF2-40B4-BE49-F238E27FC236}">
+                <a16:creationId xmlns:a16="http://schemas.microsoft.com/office/drawing/2014/main" id="{387F4D87-F528-414D-86B4-2929DBDE5134}"/>
+              </a:ext>
+            </a:extLst>
+          </p:cNvPr>
+          <p:cNvPicPr>
+            <a:picLocks noChangeAspect="1"/>
+          </p:cNvPicPr>
+          <p:nvPr/>
+        </p:nvPicPr>
+        <p:blipFill>
+          <a:blip r:embed="rId2"/>
+          <a:stretch>
+            <a:fillRect/>
+          </a:stretch>
+        </p:blipFill>
+        <p:spPr>
+          <a:xfrm>
+            <a:off x="838200" y="1228165"/>
+            <a:ext cx="10022541" cy="4464423"/>
+          </a:xfrm>
+          <a:prstGeom prst="rect">
+            <a:avLst/>
+          </a:prstGeom>
+        </p:spPr>
+      </p:pic>
+    </p:spTree>
+    <p:extLst>
+      <p:ext uri="{BB962C8B-B14F-4D97-AF65-F5344CB8AC3E}">
+        <p14:creationId xmlns:p14="http://schemas.microsoft.com/office/powerpoint/2010/main" val="269457714"/>
+      </p:ext>
+    </p:extLst>
+  </p:cSld>
+  <p:clrMapOvr>
+    <a:masterClrMapping/>
+  </p:clrMapOvr>
+</p:sld>
+</file>
+
+<file path=ppt/slides/slide7.xml><?xml version="1.0" encoding="utf-8"?>
+<p:sld xmlns:a="http://schemas.openxmlformats.org/drawingml/2006/main" xmlns:r="http://schemas.openxmlformats.org/officeDocument/2006/relationships" xmlns:p="http://schemas.openxmlformats.org/presentationml/2006/main">
+  <p:cSld>
+    <p:spTree>
+      <p:nvGrpSpPr>
+        <p:cNvPr id="1" name=""/>
+        <p:cNvGrpSpPr/>
+        <p:nvPr/>
+      </p:nvGrpSpPr>
+      <p:grpSpPr>
+        <a:xfrm>
+          <a:off x="0" y="0"/>
+          <a:ext cx="0" cy="0"/>
+          <a:chOff x="0" y="0"/>
+          <a:chExt cx="0" cy="0"/>
+        </a:xfrm>
+      </p:grpSpPr>
+      <p:pic>
+        <p:nvPicPr>
+          <p:cNvPr id="4" name="Content Placeholder 3">
+            <a:extLst>
+              <a:ext uri="{FF2B5EF4-FFF2-40B4-BE49-F238E27FC236}">
+                <a16:creationId xmlns:a16="http://schemas.microsoft.com/office/drawing/2014/main" id="{282B8C8D-4153-4D64-A914-B32C7C254899}"/>
+              </a:ext>
+            </a:extLst>
+          </p:cNvPr>
+          <p:cNvPicPr>
+            <a:picLocks noGrp="1" noChangeAspect="1"/>
+          </p:cNvPicPr>
+          <p:nvPr>
+            <p:ph idx="1"/>
+          </p:nvPr>
+        </p:nvPicPr>
+        <p:blipFill>
+          <a:blip r:embed="rId2"/>
+          <a:stretch>
+            <a:fillRect/>
+          </a:stretch>
+        </p:blipFill>
+        <p:spPr>
+          <a:xfrm>
+            <a:off x="987705" y="152400"/>
+            <a:ext cx="10406435" cy="3276600"/>
+          </a:xfrm>
+          <a:prstGeom prst="rect">
+            <a:avLst/>
+          </a:prstGeom>
+        </p:spPr>
+      </p:pic>
+      <p:sp>
+        <p:nvSpPr>
+          <p:cNvPr id="5" name="TextBox 4">
+            <a:extLst>
+              <a:ext uri="{FF2B5EF4-FFF2-40B4-BE49-F238E27FC236}">
+                <a16:creationId xmlns:a16="http://schemas.microsoft.com/office/drawing/2014/main" id="{2C211413-B4A1-4277-A732-599383286F63}"/>
+              </a:ext>
+            </a:extLst>
+          </p:cNvPr>
+          <p:cNvSpPr txBox="1"/>
+          <p:nvPr/>
+        </p:nvSpPr>
+        <p:spPr>
+          <a:xfrm>
+            <a:off x="1308847" y="3747247"/>
+            <a:ext cx="10406435" cy="3108543"/>
+          </a:xfrm>
+          <a:prstGeom prst="rect">
+            <a:avLst/>
+          </a:prstGeom>
+          <a:noFill/>
+        </p:spPr>
+        <p:txBody>
+          <a:bodyPr wrap="square" rtlCol="0">
+            <a:spAutoFit/>
+          </a:bodyPr>
+          <a:lstStyle/>
+          <a:p>
+            <a:r>
+              <a:rPr lang="en-US" sz="2800" b="1">
+                <a:latin typeface="Times New Roman" panose="02020603050405020304" pitchFamily="18" charset="0"/>
+                <a:cs typeface="Times New Roman" panose="02020603050405020304" pitchFamily="18" charset="0"/>
+              </a:rPr>
+              <a:t>Nhận xét:</a:t>
+            </a:r>
+          </a:p>
+          <a:p>
+            <a:r>
+              <a:rPr lang="vi-VN" sz="2800">
+                <a:latin typeface="Times New Roman" panose="02020603050405020304" pitchFamily="18" charset="0"/>
+                <a:cs typeface="Times New Roman" panose="02020603050405020304" pitchFamily="18" charset="0"/>
+              </a:rPr>
+              <a:t>+ Dataset có 541.909 dòng, 8 cột, khá lớn.</a:t>
+            </a:r>
+            <a:endParaRPr lang="en-US" sz="2800">
+              <a:latin typeface="Times New Roman" panose="02020603050405020304" pitchFamily="18" charset="0"/>
+              <a:cs typeface="Times New Roman" panose="02020603050405020304" pitchFamily="18" charset="0"/>
+            </a:endParaRPr>
+          </a:p>
+          <a:p>
+            <a:r>
+              <a:rPr lang="vi-VN" sz="2800">
+                <a:latin typeface="Times New Roman" panose="02020603050405020304" pitchFamily="18" charset="0"/>
+                <a:cs typeface="Times New Roman" panose="02020603050405020304" pitchFamily="18" charset="0"/>
+              </a:rPr>
+              <a:t>+ Cột </a:t>
+            </a:r>
+            <a:r>
+              <a:rPr lang="vi-VN" sz="2800" b="1">
+                <a:latin typeface="Times New Roman" panose="02020603050405020304" pitchFamily="18" charset="0"/>
+                <a:cs typeface="Times New Roman" panose="02020603050405020304" pitchFamily="18" charset="0"/>
+              </a:rPr>
+              <a:t>CustomerID</a:t>
+            </a:r>
+            <a:r>
+              <a:rPr lang="vi-VN" sz="2800">
+                <a:latin typeface="Times New Roman" panose="02020603050405020304" pitchFamily="18" charset="0"/>
+                <a:cs typeface="Times New Roman" panose="02020603050405020304" pitchFamily="18" charset="0"/>
+              </a:rPr>
+              <a:t> bị thiếu khá nhiều (~25%)</a:t>
+            </a:r>
+            <a:endParaRPr lang="en-US" sz="2800">
+              <a:latin typeface="Times New Roman" panose="02020603050405020304" pitchFamily="18" charset="0"/>
+              <a:cs typeface="Times New Roman" panose="02020603050405020304" pitchFamily="18" charset="0"/>
+            </a:endParaRPr>
+          </a:p>
+          <a:p>
+            <a:r>
+              <a:rPr lang="vi-VN" sz="2800">
+                <a:latin typeface="Times New Roman" panose="02020603050405020304" pitchFamily="18" charset="0"/>
+                <a:cs typeface="Times New Roman" panose="02020603050405020304" pitchFamily="18" charset="0"/>
+              </a:rPr>
+              <a:t>+ Cột </a:t>
+            </a:r>
+            <a:r>
+              <a:rPr lang="vi-VN" sz="2800" b="1">
+                <a:latin typeface="Times New Roman" panose="02020603050405020304" pitchFamily="18" charset="0"/>
+                <a:cs typeface="Times New Roman" panose="02020603050405020304" pitchFamily="18" charset="0"/>
+              </a:rPr>
+              <a:t>Quantity</a:t>
+            </a:r>
+            <a:r>
+              <a:rPr lang="vi-VN" sz="2800">
+                <a:latin typeface="Times New Roman" panose="02020603050405020304" pitchFamily="18" charset="0"/>
+                <a:cs typeface="Times New Roman" panose="02020603050405020304" pitchFamily="18" charset="0"/>
+              </a:rPr>
+              <a:t> có thể có giá trị âm (trả hàng, lỗi dữ liệu)</a:t>
+            </a:r>
+            <a:endParaRPr lang="en-US" sz="2800">
+              <a:latin typeface="Times New Roman" panose="02020603050405020304" pitchFamily="18" charset="0"/>
+              <a:cs typeface="Times New Roman" panose="02020603050405020304" pitchFamily="18" charset="0"/>
+            </a:endParaRPr>
+          </a:p>
+          <a:p>
+            <a:r>
+              <a:rPr lang="vi-VN" sz="2800">
+                <a:latin typeface="Times New Roman" panose="02020603050405020304" pitchFamily="18" charset="0"/>
+                <a:cs typeface="Times New Roman" panose="02020603050405020304" pitchFamily="18" charset="0"/>
+              </a:rPr>
+              <a:t>+ Cột </a:t>
+            </a:r>
+            <a:r>
+              <a:rPr lang="vi-VN" sz="2800" b="1">
+                <a:latin typeface="Times New Roman" panose="02020603050405020304" pitchFamily="18" charset="0"/>
+                <a:cs typeface="Times New Roman" panose="02020603050405020304" pitchFamily="18" charset="0"/>
+              </a:rPr>
+              <a:t>UnitPrice</a:t>
+            </a:r>
+            <a:r>
+              <a:rPr lang="vi-VN" sz="2800">
+                <a:latin typeface="Times New Roman" panose="02020603050405020304" pitchFamily="18" charset="0"/>
+                <a:cs typeface="Times New Roman" panose="02020603050405020304" pitchFamily="18" charset="0"/>
+              </a:rPr>
+              <a:t> có thể bằng 0 (lỗi dữ liệu)</a:t>
+            </a:r>
+            <a:endParaRPr lang="en-US" sz="2800">
+              <a:latin typeface="Times New Roman" panose="02020603050405020304" pitchFamily="18" charset="0"/>
+              <a:cs typeface="Times New Roman" panose="02020603050405020304" pitchFamily="18" charset="0"/>
+            </a:endParaRPr>
+          </a:p>
+          <a:p>
+            <a:r>
+              <a:rPr lang="vi-VN" sz="2800">
+                <a:latin typeface="Times New Roman" panose="02020603050405020304" pitchFamily="18" charset="0"/>
+                <a:cs typeface="Times New Roman" panose="02020603050405020304" pitchFamily="18" charset="0"/>
+              </a:rPr>
+              <a:t>+ Cột </a:t>
+            </a:r>
+            <a:r>
+              <a:rPr lang="vi-VN" sz="2800" b="1">
+                <a:latin typeface="Times New Roman" panose="02020603050405020304" pitchFamily="18" charset="0"/>
+                <a:cs typeface="Times New Roman" panose="02020603050405020304" pitchFamily="18" charset="0"/>
+              </a:rPr>
+              <a:t>InvoiceDat</a:t>
+            </a:r>
+            <a:r>
+              <a:rPr lang="en-US" sz="2800" b="1">
+                <a:latin typeface="Times New Roman" panose="02020603050405020304" pitchFamily="18" charset="0"/>
+                <a:cs typeface="Times New Roman" panose="02020603050405020304" pitchFamily="18" charset="0"/>
+              </a:rPr>
+              <a:t>e</a:t>
+            </a:r>
+            <a:r>
+              <a:rPr lang="vi-VN" sz="2800" b="1">
+                <a:latin typeface="Times New Roman" panose="02020603050405020304" pitchFamily="18" charset="0"/>
+                <a:cs typeface="Times New Roman" panose="02020603050405020304" pitchFamily="18" charset="0"/>
+              </a:rPr>
+              <a:t> </a:t>
+            </a:r>
+            <a:r>
+              <a:rPr lang="vi-VN" sz="2800">
+                <a:latin typeface="Times New Roman" panose="02020603050405020304" pitchFamily="18" charset="0"/>
+                <a:cs typeface="Times New Roman" panose="02020603050405020304" pitchFamily="18" charset="0"/>
+              </a:rPr>
+              <a:t>cần chuyển sang datetime</a:t>
+            </a:r>
+            <a:endParaRPr lang="en-US" sz="2800">
+              <a:latin typeface="Times New Roman" panose="02020603050405020304" pitchFamily="18" charset="0"/>
+              <a:cs typeface="Times New Roman" panose="02020603050405020304" pitchFamily="18" charset="0"/>
+            </a:endParaRPr>
+          </a:p>
+          <a:p>
+            <a:r>
+              <a:rPr lang="vi-VN" sz="2800">
+                <a:latin typeface="Times New Roman" panose="02020603050405020304" pitchFamily="18" charset="0"/>
+                <a:cs typeface="Times New Roman" panose="02020603050405020304" pitchFamily="18" charset="0"/>
+              </a:rPr>
+              <a:t>=&gt; Cần làm sạch dữ liệu trước khi tính RFM và áp dụng mô hình ML.</a:t>
+            </a:r>
+            <a:endParaRPr lang="en-US" sz="2800">
+              <a:latin typeface="Times New Roman" panose="02020603050405020304" pitchFamily="18" charset="0"/>
+              <a:cs typeface="Times New Roman" panose="02020603050405020304" pitchFamily="18" charset="0"/>
+            </a:endParaRPr>
+          </a:p>
+        </p:txBody>
+      </p:sp>
+    </p:spTree>
+    <p:extLst>
+      <p:ext uri="{BB962C8B-B14F-4D97-AF65-F5344CB8AC3E}">
+        <p14:creationId xmlns:p14="http://schemas.microsoft.com/office/powerpoint/2010/main" val="1197197844"/>
+      </p:ext>
+    </p:extLst>
+  </p:cSld>
+  <p:clrMapOvr>
+    <a:masterClrMapping/>
+  </p:clrMapOvr>
+</p:sld>
+</file>
+
+<file path=ppt/slides/slide8.xml><?xml version="1.0" encoding="utf-8"?>
+<p:sld xmlns:a="http://schemas.openxmlformats.org/drawingml/2006/main" xmlns:r="http://schemas.openxmlformats.org/officeDocument/2006/relationships" xmlns:p="http://schemas.openxmlformats.org/presentationml/2006/main">
+  <p:cSld>
+    <p:spTree>
+      <p:nvGrpSpPr>
+        <p:cNvPr id="1" name=""/>
+        <p:cNvGrpSpPr/>
+        <p:nvPr/>
+      </p:nvGrpSpPr>
+      <p:grpSpPr>
+        <a:xfrm>
+          <a:off x="0" y="0"/>
+          <a:ext cx="0" cy="0"/>
+          <a:chOff x="0" y="0"/>
+          <a:chExt cx="0" cy="0"/>
+        </a:xfrm>
+      </p:grpSpPr>
+      <p:sp>
+        <p:nvSpPr>
+          <p:cNvPr id="2" name="Title 1">
+            <a:extLst>
+              <a:ext uri="{FF2B5EF4-FFF2-40B4-BE49-F238E27FC236}">
+                <a16:creationId xmlns:a16="http://schemas.microsoft.com/office/drawing/2014/main" id="{0A8E49EA-241F-4030-9BF1-B3AFB21B5EAD}"/>
+              </a:ext>
+            </a:extLst>
+          </p:cNvPr>
+          <p:cNvSpPr>
+            <a:spLocks noGrp="1"/>
+          </p:cNvSpPr>
+          <p:nvPr>
+            <p:ph type="title"/>
+          </p:nvPr>
+        </p:nvSpPr>
+        <p:spPr>
+          <a:xfrm>
+            <a:off x="838200" y="146709"/>
+            <a:ext cx="10515600" cy="939228"/>
+          </a:xfrm>
+        </p:spPr>
+        <p:txBody>
+          <a:bodyPr>
+            <a:normAutofit/>
+          </a:bodyPr>
+          <a:lstStyle/>
+          <a:p>
+            <a:r>
+              <a:rPr lang="en-US" sz="3000">
+                <a:latin typeface="Times New Roman" panose="02020603050405020304" pitchFamily="18" charset="0"/>
+                <a:cs typeface="Times New Roman" panose="02020603050405020304" pitchFamily="18" charset="0"/>
+              </a:rPr>
+              <a:t>2. Các tính chất thống kê trên dữ liệu số:</a:t>
+            </a:r>
+          </a:p>
+        </p:txBody>
+      </p:sp>
+      <p:pic>
+        <p:nvPicPr>
+          <p:cNvPr id="4" name="Content Placeholder 3">
+            <a:extLst>
+              <a:ext uri="{FF2B5EF4-FFF2-40B4-BE49-F238E27FC236}">
+                <a16:creationId xmlns:a16="http://schemas.microsoft.com/office/drawing/2014/main" id="{548E1465-4433-44CE-A8B9-EECA56EDC989}"/>
+              </a:ext>
+            </a:extLst>
+          </p:cNvPr>
+          <p:cNvPicPr>
+            <a:picLocks noGrp="1" noChangeAspect="1"/>
+          </p:cNvPicPr>
+          <p:nvPr>
+            <p:ph idx="1"/>
+          </p:nvPr>
+        </p:nvPicPr>
+        <p:blipFill>
+          <a:blip r:embed="rId2"/>
+          <a:stretch>
+            <a:fillRect/>
+          </a:stretch>
+        </p:blipFill>
+        <p:spPr>
+          <a:xfrm>
+            <a:off x="757518" y="887505"/>
+            <a:ext cx="10515600" cy="1635207"/>
+          </a:xfrm>
+          <a:prstGeom prst="rect">
+            <a:avLst/>
+          </a:prstGeom>
+        </p:spPr>
+      </p:pic>
+      <p:sp>
+        <p:nvSpPr>
+          <p:cNvPr id="5" name="TextBox 4">
+            <a:extLst>
+              <a:ext uri="{FF2B5EF4-FFF2-40B4-BE49-F238E27FC236}">
+                <a16:creationId xmlns:a16="http://schemas.microsoft.com/office/drawing/2014/main" id="{09EE6AF8-A645-4FA3-8466-2E453B98CB47}"/>
+              </a:ext>
+            </a:extLst>
+          </p:cNvPr>
+          <p:cNvSpPr txBox="1"/>
+          <p:nvPr/>
+        </p:nvSpPr>
+        <p:spPr>
+          <a:xfrm>
+            <a:off x="757518" y="2549965"/>
+            <a:ext cx="10399059" cy="4401205"/>
+          </a:xfrm>
+          <a:prstGeom prst="rect">
+            <a:avLst/>
+          </a:prstGeom>
+          <a:noFill/>
+        </p:spPr>
+        <p:txBody>
+          <a:bodyPr wrap="square" rtlCol="0">
+            <a:spAutoFit/>
+          </a:bodyPr>
+          <a:lstStyle/>
+          <a:p>
+            <a:r>
+              <a:rPr lang="vi-VN" sz="2800" b="1">
+                <a:latin typeface="+mj-lt"/>
+              </a:rPr>
+              <a:t>Nhận xét</a:t>
+            </a:r>
+            <a:r>
+              <a:rPr lang="en-US" sz="2800" b="1">
+                <a:latin typeface="+mj-lt"/>
+              </a:rPr>
+              <a:t>:</a:t>
+            </a:r>
+          </a:p>
+          <a:p>
+            <a:r>
+              <a:rPr lang="vi-VN" sz="2800">
+                <a:latin typeface="+mj-lt"/>
+              </a:rPr>
+              <a:t>+ Quantity: có giá trị âm, đa số khách hàng mua &lt;= 10 sản phẩm/giao dịch, những giá trị lớn hơn có khả năng cao là outlier(giá trị ngoại lại) so với hành vi bình thường  → dữ liệu trả hàng, cần xử lý/loại bỏ.</a:t>
+            </a:r>
+            <a:endParaRPr lang="en-US" sz="2800">
+              <a:latin typeface="+mj-lt"/>
+            </a:endParaRPr>
+          </a:p>
+          <a:p>
+            <a:r>
+              <a:rPr lang="vi-VN" sz="2800">
+                <a:latin typeface="+mj-lt"/>
+              </a:rPr>
+              <a:t>+ UnitPrice: có giá trị &lt;= 0 và giá thường &lt;= 4.13, nên các giá còn lại có khả năng lỗi rất cao → dữ liệu lỗi.</a:t>
+            </a:r>
+            <a:endParaRPr lang="en-US" sz="2800">
+              <a:latin typeface="+mj-lt"/>
+            </a:endParaRPr>
+          </a:p>
+          <a:p>
+            <a:r>
+              <a:rPr lang="vi-VN" sz="2800">
+                <a:latin typeface="+mj-lt"/>
+              </a:rPr>
+              <a:t>+ CustomerID: thiếu ~135k bản ghi (chỉ có 406.829/541.909 dòng có ID) -&gt; dữ liệu bị thiếu cần bị xóa bỏ.</a:t>
+            </a:r>
+            <a:endParaRPr lang="en-US" sz="2800">
+              <a:latin typeface="+mj-lt"/>
+            </a:endParaRPr>
+          </a:p>
+          <a:p>
+            <a:r>
+              <a:rPr lang="vi-VN" sz="2800">
+                <a:latin typeface="+mj-lt"/>
+              </a:rPr>
+              <a:t>=&gt; Dataset chứa nhiều outlier và dữ liệu không hợp lệ, cần làm sạch trước khi phân tích.</a:t>
+            </a:r>
+            <a:endParaRPr lang="en-US" sz="2800">
+              <a:latin typeface="+mj-lt"/>
+            </a:endParaRPr>
+          </a:p>
+        </p:txBody>
+      </p:sp>
+    </p:spTree>
+    <p:extLst>
+      <p:ext uri="{BB962C8B-B14F-4D97-AF65-F5344CB8AC3E}">
+        <p14:creationId xmlns:p14="http://schemas.microsoft.com/office/powerpoint/2010/main" val="3536232695"/>
+      </p:ext>
+    </p:extLst>
+  </p:cSld>
+  <p:clrMapOvr>
+    <a:masterClrMapping/>
+  </p:clrMapOvr>
+</p:sld>
+</file>
+
+<file path=ppt/slides/slide9.xml><?xml version="1.0" encoding="utf-8"?>
+<p:sld xmlns:a="http://schemas.openxmlformats.org/drawingml/2006/main" xmlns:r="http://schemas.openxmlformats.org/officeDocument/2006/relationships" xmlns:p="http://schemas.openxmlformats.org/presentationml/2006/main">
+  <p:cSld>
+    <p:spTree>
+      <p:nvGrpSpPr>
+        <p:cNvPr id="1" name=""/>
+        <p:cNvGrpSpPr/>
+        <p:nvPr/>
+      </p:nvGrpSpPr>
+      <p:grpSpPr>
+        <a:xfrm>
+          <a:off x="0" y="0"/>
+          <a:ext cx="0" cy="0"/>
+          <a:chOff x="0" y="0"/>
+          <a:chExt cx="0" cy="0"/>
+        </a:xfrm>
+      </p:grpSpPr>
+      <p:sp>
+        <p:nvSpPr>
+          <p:cNvPr id="2" name="Title 1">
+            <a:extLst>
+              <a:ext uri="{FF2B5EF4-FFF2-40B4-BE49-F238E27FC236}">
+                <a16:creationId xmlns:a16="http://schemas.microsoft.com/office/drawing/2014/main" id="{FBA80363-3AF2-4FBD-B7BE-691095A46B51}"/>
+              </a:ext>
+            </a:extLst>
+          </p:cNvPr>
+          <p:cNvSpPr>
+            <a:spLocks noGrp="1"/>
+          </p:cNvSpPr>
+          <p:nvPr>
+            <p:ph type="title"/>
+          </p:nvPr>
+        </p:nvSpPr>
+        <p:spPr/>
+        <p:txBody>
+          <a:bodyPr>
+            <a:normAutofit/>
+          </a:bodyPr>
+          <a:lstStyle/>
+          <a:p>
+            <a:r>
+              <a:rPr lang="en-US" sz="3000">
+                <a:latin typeface="Times New Roman" panose="02020603050405020304" pitchFamily="18" charset="0"/>
+                <a:cs typeface="Times New Roman" panose="02020603050405020304" pitchFamily="18" charset="0"/>
+              </a:rPr>
+              <a:t>3. Làm sạch dữ liệu:</a:t>
+            </a:r>
+          </a:p>
+        </p:txBody>
+      </p:sp>
+      <p:sp>
+        <p:nvSpPr>
+          <p:cNvPr id="3" name="Content Placeholder 2">
+            <a:extLst>
+              <a:ext uri="{FF2B5EF4-FFF2-40B4-BE49-F238E27FC236}">
+                <a16:creationId xmlns:a16="http://schemas.microsoft.com/office/drawing/2014/main" id="{52ACA88A-27B5-44FF-A816-1F6C43C60448}"/>
+              </a:ext>
+            </a:extLst>
+          </p:cNvPr>
+          <p:cNvSpPr>
+            <a:spLocks noGrp="1"/>
+          </p:cNvSpPr>
+          <p:nvPr>
+            <p:ph idx="1"/>
+          </p:nvPr>
+        </p:nvSpPr>
+        <p:spPr/>
+        <p:txBody>
+          <a:bodyPr/>
+          <a:lstStyle/>
+          <a:p>
+            <a:r>
+              <a:rPr lang="en-US">
+                <a:latin typeface="Times New Roman" panose="02020603050405020304" pitchFamily="18" charset="0"/>
+                <a:cs typeface="Times New Roman" panose="02020603050405020304" pitchFamily="18" charset="0"/>
+              </a:rPr>
+              <a:t>Xóa </a:t>
+            </a:r>
+            <a:r>
+              <a:rPr lang="en-US" b="1">
+                <a:latin typeface="Times New Roman" panose="02020603050405020304" pitchFamily="18" charset="0"/>
+                <a:cs typeface="Times New Roman" panose="02020603050405020304" pitchFamily="18" charset="0"/>
+              </a:rPr>
+              <a:t>CustomerID</a:t>
+            </a:r>
+            <a:r>
+              <a:rPr lang="en-US">
+                <a:latin typeface="Times New Roman" panose="02020603050405020304" pitchFamily="18" charset="0"/>
+                <a:cs typeface="Times New Roman" panose="02020603050405020304" pitchFamily="18" charset="0"/>
+              </a:rPr>
+              <a:t> bị null.</a:t>
+            </a:r>
+          </a:p>
+          <a:p>
+            <a:r>
+              <a:rPr lang="en-US">
+                <a:latin typeface="Times New Roman" panose="02020603050405020304" pitchFamily="18" charset="0"/>
+                <a:cs typeface="Times New Roman" panose="02020603050405020304" pitchFamily="18" charset="0"/>
+              </a:rPr>
+              <a:t>Xóa các hóa đ</a:t>
+            </a:r>
+            <a:r>
+              <a:rPr lang="vi-VN">
+                <a:latin typeface="Times New Roman" panose="02020603050405020304" pitchFamily="18" charset="0"/>
+                <a:cs typeface="Times New Roman" panose="02020603050405020304" pitchFamily="18" charset="0"/>
+              </a:rPr>
+              <a:t>ơ</a:t>
+            </a:r>
+            <a:r>
+              <a:rPr lang="en-US">
+                <a:latin typeface="Times New Roman" panose="02020603050405020304" pitchFamily="18" charset="0"/>
+                <a:cs typeface="Times New Roman" panose="02020603050405020304" pitchFamily="18" charset="0"/>
+              </a:rPr>
+              <a:t>n bị hủy.</a:t>
+            </a:r>
+          </a:p>
+          <a:p>
+            <a:r>
+              <a:rPr lang="en-US">
+                <a:latin typeface="Times New Roman" panose="02020603050405020304" pitchFamily="18" charset="0"/>
+                <a:cs typeface="Times New Roman" panose="02020603050405020304" pitchFamily="18" charset="0"/>
+              </a:rPr>
+              <a:t>Xử lí giá trị ngoại lai của </a:t>
+            </a:r>
+            <a:r>
+              <a:rPr lang="en-US" b="1">
+                <a:latin typeface="Times New Roman" panose="02020603050405020304" pitchFamily="18" charset="0"/>
+                <a:cs typeface="Times New Roman" panose="02020603050405020304" pitchFamily="18" charset="0"/>
+              </a:rPr>
+              <a:t>Quantity</a:t>
+            </a:r>
+            <a:r>
+              <a:rPr lang="en-US">
+                <a:latin typeface="Times New Roman" panose="02020603050405020304" pitchFamily="18" charset="0"/>
+                <a:cs typeface="Times New Roman" panose="02020603050405020304" pitchFamily="18" charset="0"/>
+              </a:rPr>
+              <a:t> và </a:t>
+            </a:r>
+            <a:r>
+              <a:rPr lang="en-US" b="1">
+                <a:latin typeface="Times New Roman" panose="02020603050405020304" pitchFamily="18" charset="0"/>
+                <a:cs typeface="Times New Roman" panose="02020603050405020304" pitchFamily="18" charset="0"/>
+              </a:rPr>
+              <a:t>UnitPrice.</a:t>
+            </a:r>
+          </a:p>
+          <a:p>
+            <a:r>
+              <a:rPr lang="en-US">
+                <a:latin typeface="Times New Roman" panose="02020603050405020304" pitchFamily="18" charset="0"/>
+                <a:cs typeface="Times New Roman" panose="02020603050405020304" pitchFamily="18" charset="0"/>
+              </a:rPr>
+              <a:t>Chuyển InvoiceDate sang kiểu datetime.</a:t>
+            </a:r>
+          </a:p>
+          <a:p>
+            <a:endParaRPr lang="en-US">
+              <a:latin typeface="Times New Roman" panose="02020603050405020304" pitchFamily="18" charset="0"/>
+              <a:cs typeface="Times New Roman" panose="02020603050405020304" pitchFamily="18" charset="0"/>
+            </a:endParaRPr>
+          </a:p>
+        </p:txBody>
+      </p:sp>
+    </p:spTree>
+    <p:extLst>
+      <p:ext uri="{BB962C8B-B14F-4D97-AF65-F5344CB8AC3E}">
+        <p14:creationId xmlns:p14="http://schemas.microsoft.com/office/powerpoint/2010/main" val="182430964"/>
       </p:ext>
     </p:extLst>
   </p:cSld>

</xml_diff>